<commit_message>
Improve the diagram, again.
</commit_message>
<xml_diff>
--- a/images/src/jetisu diagrams.pptx
+++ b/images/src/jetisu diagrams.pptx
@@ -20879,7 +20879,7 @@
           <a:p>
             <a:fld id="{EB429232-E4BA-4B3A-9952-EE5A117FBC50}" type="datetimeFigureOut">
               <a:rPr lang="en-AU" smtClean="0"/>
-              <a:t>15/02/2023</a:t>
+              <a:t>19/02/2023</a:t>
             </a:fld>
             <a:endParaRPr lang="en-AU"/>
           </a:p>
@@ -21079,7 +21079,7 @@
           <a:p>
             <a:fld id="{EB429232-E4BA-4B3A-9952-EE5A117FBC50}" type="datetimeFigureOut">
               <a:rPr lang="en-AU" smtClean="0"/>
-              <a:t>15/02/2023</a:t>
+              <a:t>19/02/2023</a:t>
             </a:fld>
             <a:endParaRPr lang="en-AU"/>
           </a:p>
@@ -21289,7 +21289,7 @@
           <a:p>
             <a:fld id="{EB429232-E4BA-4B3A-9952-EE5A117FBC50}" type="datetimeFigureOut">
               <a:rPr lang="en-AU" smtClean="0"/>
-              <a:t>15/02/2023</a:t>
+              <a:t>19/02/2023</a:t>
             </a:fld>
             <a:endParaRPr lang="en-AU"/>
           </a:p>
@@ -21489,7 +21489,7 @@
           <a:p>
             <a:fld id="{EB429232-E4BA-4B3A-9952-EE5A117FBC50}" type="datetimeFigureOut">
               <a:rPr lang="en-AU" smtClean="0"/>
-              <a:t>15/02/2023</a:t>
+              <a:t>19/02/2023</a:t>
             </a:fld>
             <a:endParaRPr lang="en-AU"/>
           </a:p>
@@ -21765,7 +21765,7 @@
           <a:p>
             <a:fld id="{EB429232-E4BA-4B3A-9952-EE5A117FBC50}" type="datetimeFigureOut">
               <a:rPr lang="en-AU" smtClean="0"/>
-              <a:t>15/02/2023</a:t>
+              <a:t>19/02/2023</a:t>
             </a:fld>
             <a:endParaRPr lang="en-AU"/>
           </a:p>
@@ -22033,7 +22033,7 @@
           <a:p>
             <a:fld id="{EB429232-E4BA-4B3A-9952-EE5A117FBC50}" type="datetimeFigureOut">
               <a:rPr lang="en-AU" smtClean="0"/>
-              <a:t>15/02/2023</a:t>
+              <a:t>19/02/2023</a:t>
             </a:fld>
             <a:endParaRPr lang="en-AU"/>
           </a:p>
@@ -22448,7 +22448,7 @@
           <a:p>
             <a:fld id="{EB429232-E4BA-4B3A-9952-EE5A117FBC50}" type="datetimeFigureOut">
               <a:rPr lang="en-AU" smtClean="0"/>
-              <a:t>15/02/2023</a:t>
+              <a:t>19/02/2023</a:t>
             </a:fld>
             <a:endParaRPr lang="en-AU"/>
           </a:p>
@@ -22590,7 +22590,7 @@
           <a:p>
             <a:fld id="{EB429232-E4BA-4B3A-9952-EE5A117FBC50}" type="datetimeFigureOut">
               <a:rPr lang="en-AU" smtClean="0"/>
-              <a:t>15/02/2023</a:t>
+              <a:t>19/02/2023</a:t>
             </a:fld>
             <a:endParaRPr lang="en-AU"/>
           </a:p>
@@ -22703,7 +22703,7 @@
           <a:p>
             <a:fld id="{EB429232-E4BA-4B3A-9952-EE5A117FBC50}" type="datetimeFigureOut">
               <a:rPr lang="en-AU" smtClean="0"/>
-              <a:t>15/02/2023</a:t>
+              <a:t>19/02/2023</a:t>
             </a:fld>
             <a:endParaRPr lang="en-AU"/>
           </a:p>
@@ -23016,7 +23016,7 @@
           <a:p>
             <a:fld id="{EB429232-E4BA-4B3A-9952-EE5A117FBC50}" type="datetimeFigureOut">
               <a:rPr lang="en-AU" smtClean="0"/>
-              <a:t>15/02/2023</a:t>
+              <a:t>19/02/2023</a:t>
             </a:fld>
             <a:endParaRPr lang="en-AU"/>
           </a:p>
@@ -23305,7 +23305,7 @@
           <a:p>
             <a:fld id="{EB429232-E4BA-4B3A-9952-EE5A117FBC50}" type="datetimeFigureOut">
               <a:rPr lang="en-AU" smtClean="0"/>
-              <a:t>15/02/2023</a:t>
+              <a:t>19/02/2023</a:t>
             </a:fld>
             <a:endParaRPr lang="en-AU"/>
           </a:p>
@@ -23548,7 +23548,7 @@
           <a:p>
             <a:fld id="{EB429232-E4BA-4B3A-9952-EE5A117FBC50}" type="datetimeFigureOut">
               <a:rPr lang="en-AU" smtClean="0"/>
-              <a:t>15/02/2023</a:t>
+              <a:t>19/02/2023</a:t>
             </a:fld>
             <a:endParaRPr lang="en-AU"/>
           </a:p>
@@ -24379,542 +24379,6 @@
       </p:grpSpPr>
       <p:grpSp>
         <p:nvGrpSpPr>
-          <p:cNvPr id="87" name="Group 86">
-            <a:extLst>
-              <a:ext uri="{FF2B5EF4-FFF2-40B4-BE49-F238E27FC236}">
-                <a16:creationId xmlns:a16="http://schemas.microsoft.com/office/drawing/2014/main" id="{CAE53593-E0B9-139C-70BE-C8AFFA32AD83}"/>
-              </a:ext>
-            </a:extLst>
-          </p:cNvPr>
-          <p:cNvGrpSpPr/>
-          <p:nvPr/>
-        </p:nvGrpSpPr>
-        <p:grpSpPr>
-          <a:xfrm>
-            <a:off x="5852407" y="288046"/>
-            <a:ext cx="4275094" cy="2379415"/>
-            <a:chOff x="6812006" y="559056"/>
-            <a:chExt cx="4275094" cy="2379415"/>
-          </a:xfrm>
-        </p:grpSpPr>
-        <p:sp>
-          <p:nvSpPr>
-            <p:cNvPr id="14" name="Rectangle 13">
-              <a:extLst>
-                <a:ext uri="{FF2B5EF4-FFF2-40B4-BE49-F238E27FC236}">
-                  <a16:creationId xmlns:a16="http://schemas.microsoft.com/office/drawing/2014/main" id="{2B4080B8-42F3-4F8D-FBB2-8CB777385CE7}"/>
-                </a:ext>
-              </a:extLst>
-            </p:cNvPr>
-            <p:cNvSpPr/>
-            <p:nvPr/>
-          </p:nvSpPr>
-          <p:spPr>
-            <a:xfrm>
-              <a:off x="6812006" y="1113086"/>
-              <a:ext cx="4275094" cy="1825385"/>
-            </a:xfrm>
-            <a:prstGeom prst="rect">
-              <a:avLst/>
-            </a:prstGeom>
-            <a:solidFill>
-              <a:srgbClr val="7030A0">
-                <a:alpha val="30980"/>
-              </a:srgbClr>
-            </a:solidFill>
-            <a:scene3d>
-              <a:camera prst="isometricOffAxis1Right"/>
-              <a:lightRig rig="threePt" dir="t"/>
-            </a:scene3d>
-            <a:sp3d extrusionH="1803400"/>
-          </p:spPr>
-          <p:style>
-            <a:lnRef idx="2">
-              <a:schemeClr val="accent1">
-                <a:shade val="50000"/>
-              </a:schemeClr>
-            </a:lnRef>
-            <a:fillRef idx="1">
-              <a:schemeClr val="accent1"/>
-            </a:fillRef>
-            <a:effectRef idx="0">
-              <a:schemeClr val="accent1"/>
-            </a:effectRef>
-            <a:fontRef idx="minor">
-              <a:schemeClr val="lt1"/>
-            </a:fontRef>
-          </p:style>
-          <p:txBody>
-            <a:bodyPr rtlCol="0" anchor="ctr"/>
-            <a:lstStyle/>
-            <a:p>
-              <a:pPr algn="ctr"/>
-              <a:endParaRPr lang="en-AU"/>
-            </a:p>
-          </p:txBody>
-        </p:sp>
-        <p:pic>
-          <p:nvPicPr>
-            <p:cNvPr id="15" name="Picture 14">
-              <a:extLst>
-                <a:ext uri="{FF2B5EF4-FFF2-40B4-BE49-F238E27FC236}">
-                  <a16:creationId xmlns:a16="http://schemas.microsoft.com/office/drawing/2014/main" id="{F466AE72-54D8-447C-43C4-C50DB237B69C}"/>
-                </a:ext>
-              </a:extLst>
-            </p:cNvPr>
-            <p:cNvPicPr>
-              <a:picLocks noChangeAspect="1"/>
-            </p:cNvPicPr>
-            <p:nvPr/>
-          </p:nvPicPr>
-          <p:blipFill>
-            <a:blip r:embed="rId2"/>
-            <a:stretch>
-              <a:fillRect/>
-            </a:stretch>
-          </p:blipFill>
-          <p:spPr>
-            <a:xfrm>
-              <a:off x="8352450" y="1131684"/>
-              <a:ext cx="2015528" cy="852600"/>
-            </a:xfrm>
-            <a:prstGeom prst="rect">
-              <a:avLst/>
-            </a:prstGeom>
-            <a:solidFill>
-              <a:srgbClr val="7030A0">
-                <a:alpha val="30980"/>
-              </a:srgbClr>
-            </a:solidFill>
-            <a:scene3d>
-              <a:camera prst="isometricOffAxis1Right"/>
-              <a:lightRig rig="threePt" dir="t"/>
-            </a:scene3d>
-          </p:spPr>
-        </p:pic>
-        <p:sp>
-          <p:nvSpPr>
-            <p:cNvPr id="32" name="TextBox 31">
-              <a:extLst>
-                <a:ext uri="{FF2B5EF4-FFF2-40B4-BE49-F238E27FC236}">
-                  <a16:creationId xmlns:a16="http://schemas.microsoft.com/office/drawing/2014/main" id="{D5F7E915-F4BF-CADF-ECD7-9DA2EED5F1B5}"/>
-                </a:ext>
-              </a:extLst>
-            </p:cNvPr>
-            <p:cNvSpPr txBox="1"/>
-            <p:nvPr/>
-          </p:nvSpPr>
-          <p:spPr>
-            <a:xfrm>
-              <a:off x="7599456" y="2222271"/>
-              <a:ext cx="2757293" cy="584775"/>
-            </a:xfrm>
-            <a:prstGeom prst="rect">
-              <a:avLst/>
-            </a:prstGeom>
-            <a:solidFill>
-              <a:srgbClr val="7F7F7F">
-                <a:alpha val="38039"/>
-              </a:srgbClr>
-            </a:solidFill>
-            <a:scene3d>
-              <a:camera prst="isometricOffAxis1Right"/>
-              <a:lightRig rig="threePt" dir="t"/>
-            </a:scene3d>
-          </p:spPr>
-          <p:txBody>
-            <a:bodyPr wrap="none" rtlCol="0">
-              <a:spAutoFit/>
-            </a:bodyPr>
-            <a:lstStyle/>
-            <a:p>
-              <a:pPr algn="ctr"/>
-              <a:r>
-                <a:rPr lang="en-AU" sz="1600" dirty="0"/>
-                <a:t>Intensionally Defined Relations</a:t>
-              </a:r>
-              <a:br>
-                <a:rPr lang="en-AU" sz="1600" dirty="0"/>
-              </a:br>
-              <a:r>
-                <a:rPr lang="en-AU" sz="1600" dirty="0"/>
-                <a:t>(Rules and Code)</a:t>
-              </a:r>
-            </a:p>
-          </p:txBody>
-        </p:sp>
-        <p:pic>
-          <p:nvPicPr>
-            <p:cNvPr id="41" name="Picture 40">
-              <a:extLst>
-                <a:ext uri="{FF2B5EF4-FFF2-40B4-BE49-F238E27FC236}">
-                  <a16:creationId xmlns:a16="http://schemas.microsoft.com/office/drawing/2014/main" id="{FB707429-710A-D467-C4EB-D3B65485D3A1}"/>
-                </a:ext>
-              </a:extLst>
-            </p:cNvPr>
-            <p:cNvPicPr>
-              <a:picLocks noChangeAspect="1"/>
-            </p:cNvPicPr>
-            <p:nvPr/>
-          </p:nvPicPr>
-          <p:blipFill>
-            <a:blip r:embed="rId2"/>
-            <a:stretch>
-              <a:fillRect/>
-            </a:stretch>
-          </p:blipFill>
-          <p:spPr>
-            <a:xfrm>
-              <a:off x="7083611" y="1454069"/>
-              <a:ext cx="1031690" cy="436421"/>
-            </a:xfrm>
-            <a:prstGeom prst="rect">
-              <a:avLst/>
-            </a:prstGeom>
-            <a:scene3d>
-              <a:camera prst="isometricOffAxis1Right"/>
-              <a:lightRig rig="threePt" dir="t"/>
-            </a:scene3d>
-          </p:spPr>
-        </p:pic>
-        <p:sp>
-          <p:nvSpPr>
-            <p:cNvPr id="50" name="TextBox 49">
-              <a:extLst>
-                <a:ext uri="{FF2B5EF4-FFF2-40B4-BE49-F238E27FC236}">
-                  <a16:creationId xmlns:a16="http://schemas.microsoft.com/office/drawing/2014/main" id="{BCAFEC12-1DA4-76B6-0B88-08E038EEFD7B}"/>
-                </a:ext>
-              </a:extLst>
-            </p:cNvPr>
-            <p:cNvSpPr txBox="1"/>
-            <p:nvPr/>
-          </p:nvSpPr>
-          <p:spPr>
-            <a:xfrm>
-              <a:off x="6812006" y="559056"/>
-              <a:ext cx="3884261" cy="646331"/>
-            </a:xfrm>
-            <a:prstGeom prst="rect">
-              <a:avLst/>
-            </a:prstGeom>
-            <a:noFill/>
-            <a:scene3d>
-              <a:camera prst="isometricOffAxis1Right"/>
-              <a:lightRig rig="threePt" dir="t"/>
-            </a:scene3d>
-          </p:spPr>
-          <p:txBody>
-            <a:bodyPr wrap="square">
-              <a:spAutoFit/>
-            </a:bodyPr>
-            <a:lstStyle/>
-            <a:p>
-              <a:pPr lvl="0"/>
-              <a:r>
-                <a:rPr lang="en-AU" sz="1200" dirty="0">
-                  <a:solidFill>
-                    <a:schemeClr val="bg1"/>
-                  </a:solidFill>
-                </a:rPr>
-                <a:t>Logic, Constraints, Search, Numerical Methods, Linear Programming, Symbolic Computation, Termination, Negation, Stratification, Type Theory, Multiple Semantics </a:t>
-              </a:r>
-            </a:p>
-          </p:txBody>
-        </p:sp>
-      </p:grpSp>
-      <p:grpSp>
-        <p:nvGrpSpPr>
-          <p:cNvPr id="88" name="Group 87">
-            <a:extLst>
-              <a:ext uri="{FF2B5EF4-FFF2-40B4-BE49-F238E27FC236}">
-                <a16:creationId xmlns:a16="http://schemas.microsoft.com/office/drawing/2014/main" id="{B317216B-3692-9959-E8B5-8A7A18E4748D}"/>
-              </a:ext>
-            </a:extLst>
-          </p:cNvPr>
-          <p:cNvGrpSpPr/>
-          <p:nvPr/>
-        </p:nvGrpSpPr>
-        <p:grpSpPr>
-          <a:xfrm>
-            <a:off x="6107952" y="3429300"/>
-            <a:ext cx="6026413" cy="2980218"/>
-            <a:chOff x="5746685" y="3283686"/>
-            <a:chExt cx="4794382" cy="2980218"/>
-          </a:xfrm>
-        </p:grpSpPr>
-        <p:sp>
-          <p:nvSpPr>
-            <p:cNvPr id="2" name="Rectangle 1">
-              <a:extLst>
-                <a:ext uri="{FF2B5EF4-FFF2-40B4-BE49-F238E27FC236}">
-                  <a16:creationId xmlns:a16="http://schemas.microsoft.com/office/drawing/2014/main" id="{0A9D2A6D-12CF-41CA-9B39-4855A57C3F80}"/>
-                </a:ext>
-              </a:extLst>
-            </p:cNvPr>
-            <p:cNvSpPr/>
-            <p:nvPr/>
-          </p:nvSpPr>
-          <p:spPr>
-            <a:xfrm>
-              <a:off x="5746685" y="3770185"/>
-              <a:ext cx="4794382" cy="2493719"/>
-            </a:xfrm>
-            <a:prstGeom prst="rect">
-              <a:avLst/>
-            </a:prstGeom>
-            <a:solidFill>
-              <a:schemeClr val="accent6">
-                <a:lumMod val="60000"/>
-                <a:lumOff val="40000"/>
-              </a:schemeClr>
-            </a:solidFill>
-            <a:scene3d>
-              <a:camera prst="isometricOffAxis1Right"/>
-              <a:lightRig rig="threePt" dir="t"/>
-            </a:scene3d>
-            <a:sp3d extrusionH="1803400"/>
-          </p:spPr>
-          <p:style>
-            <a:lnRef idx="2">
-              <a:schemeClr val="accent1">
-                <a:shade val="50000"/>
-              </a:schemeClr>
-            </a:lnRef>
-            <a:fillRef idx="1">
-              <a:schemeClr val="accent1"/>
-            </a:fillRef>
-            <a:effectRef idx="0">
-              <a:schemeClr val="accent1"/>
-            </a:effectRef>
-            <a:fontRef idx="minor">
-              <a:schemeClr val="lt1"/>
-            </a:fontRef>
-          </p:style>
-          <p:txBody>
-            <a:bodyPr rtlCol="0" anchor="ctr"/>
-            <a:lstStyle/>
-            <a:p>
-              <a:pPr algn="ctr"/>
-              <a:endParaRPr lang="en-AU"/>
-            </a:p>
-          </p:txBody>
-        </p:sp>
-        <p:pic>
-          <p:nvPicPr>
-            <p:cNvPr id="5" name="Picture 4">
-              <a:extLst>
-                <a:ext uri="{FF2B5EF4-FFF2-40B4-BE49-F238E27FC236}">
-                  <a16:creationId xmlns:a16="http://schemas.microsoft.com/office/drawing/2014/main" id="{4DDBD2DF-BBB9-B531-19FD-F3E5D54946B1}"/>
-                </a:ext>
-              </a:extLst>
-            </p:cNvPr>
-            <p:cNvPicPr>
-              <a:picLocks noChangeAspect="1"/>
-            </p:cNvPicPr>
-            <p:nvPr/>
-          </p:nvPicPr>
-          <p:blipFill>
-            <a:blip r:embed="rId2"/>
-            <a:stretch>
-              <a:fillRect/>
-            </a:stretch>
-          </p:blipFill>
-          <p:spPr>
-            <a:xfrm>
-              <a:off x="6370971" y="4101855"/>
-              <a:ext cx="2662710" cy="1240096"/>
-            </a:xfrm>
-            <a:prstGeom prst="rect">
-              <a:avLst/>
-            </a:prstGeom>
-            <a:solidFill>
-              <a:schemeClr val="accent6">
-                <a:lumMod val="60000"/>
-                <a:lumOff val="40000"/>
-              </a:schemeClr>
-            </a:solidFill>
-            <a:scene3d>
-              <a:camera prst="isometricOffAxis1Right"/>
-              <a:lightRig rig="threePt" dir="t"/>
-            </a:scene3d>
-          </p:spPr>
-        </p:pic>
-        <p:sp>
-          <p:nvSpPr>
-            <p:cNvPr id="19" name="TextBox 18">
-              <a:extLst>
-                <a:ext uri="{FF2B5EF4-FFF2-40B4-BE49-F238E27FC236}">
-                  <a16:creationId xmlns:a16="http://schemas.microsoft.com/office/drawing/2014/main" id="{15AAA5EA-4BF5-C3B1-43B1-353DDA63A2D7}"/>
-                </a:ext>
-              </a:extLst>
-            </p:cNvPr>
-            <p:cNvSpPr txBox="1"/>
-            <p:nvPr/>
-          </p:nvSpPr>
-          <p:spPr>
-            <a:xfrm>
-              <a:off x="6032521" y="3283686"/>
-              <a:ext cx="3548105" cy="646331"/>
-            </a:xfrm>
-            <a:prstGeom prst="rect">
-              <a:avLst/>
-            </a:prstGeom>
-            <a:noFill/>
-            <a:scene3d>
-              <a:camera prst="isometricOffAxis1Right"/>
-              <a:lightRig rig="threePt" dir="t"/>
-            </a:scene3d>
-          </p:spPr>
-          <p:txBody>
-            <a:bodyPr wrap="none" rtlCol="0">
-              <a:spAutoFit/>
-            </a:bodyPr>
-            <a:lstStyle/>
-            <a:p>
-              <a:r>
-                <a:rPr lang="en-AU" dirty="0">
-                  <a:solidFill>
-                    <a:schemeClr val="bg1"/>
-                  </a:solidFill>
-                </a:rPr>
-                <a:t>Relational Queries with Fixed-Point Operators</a:t>
-              </a:r>
-            </a:p>
-            <a:p>
-              <a:pPr algn="ctr"/>
-              <a:r>
-                <a:rPr lang="en-AU" dirty="0">
-                  <a:solidFill>
-                    <a:schemeClr val="bg1"/>
-                  </a:solidFill>
-                </a:rPr>
-                <a:t>SQL, Datalog, LINQ, …</a:t>
-              </a:r>
-            </a:p>
-          </p:txBody>
-        </p:sp>
-        <p:sp>
-          <p:nvSpPr>
-            <p:cNvPr id="33" name="TextBox 32">
-              <a:extLst>
-                <a:ext uri="{FF2B5EF4-FFF2-40B4-BE49-F238E27FC236}">
-                  <a16:creationId xmlns:a16="http://schemas.microsoft.com/office/drawing/2014/main" id="{9B8BEA76-225A-F196-32D0-7D3F0329890D}"/>
-                </a:ext>
-              </a:extLst>
-            </p:cNvPr>
-            <p:cNvSpPr txBox="1"/>
-            <p:nvPr/>
-          </p:nvSpPr>
-          <p:spPr>
-            <a:xfrm>
-              <a:off x="6490991" y="5324894"/>
-              <a:ext cx="3548105" cy="830997"/>
-            </a:xfrm>
-            <a:prstGeom prst="rect">
-              <a:avLst/>
-            </a:prstGeom>
-            <a:solidFill>
-              <a:srgbClr val="7F7F7F">
-                <a:alpha val="38039"/>
-              </a:srgbClr>
-            </a:solidFill>
-            <a:scene3d>
-              <a:camera prst="isometricOffAxis1Right"/>
-              <a:lightRig rig="threePt" dir="t"/>
-            </a:scene3d>
-          </p:spPr>
-          <p:txBody>
-            <a:bodyPr wrap="square" rtlCol="0">
-              <a:spAutoFit/>
-            </a:bodyPr>
-            <a:lstStyle/>
-            <a:p>
-              <a:pPr algn="ctr"/>
-              <a:r>
-                <a:rPr lang="en-AU" sz="2400" dirty="0"/>
-                <a:t>Derived Relations</a:t>
-              </a:r>
-              <a:br>
-                <a:rPr lang="en-AU" sz="2400" dirty="0"/>
-              </a:br>
-              <a:r>
-                <a:rPr lang="en-AU" sz="2400" dirty="0"/>
-                <a:t>(Rules and Code applied to Data)</a:t>
-              </a:r>
-            </a:p>
-          </p:txBody>
-        </p:sp>
-        <p:pic>
-          <p:nvPicPr>
-            <p:cNvPr id="62" name="Picture 61">
-              <a:extLst>
-                <a:ext uri="{FF2B5EF4-FFF2-40B4-BE49-F238E27FC236}">
-                  <a16:creationId xmlns:a16="http://schemas.microsoft.com/office/drawing/2014/main" id="{E60A8652-5981-F36C-00B2-3CB537AD1E64}"/>
-                </a:ext>
-              </a:extLst>
-            </p:cNvPr>
-            <p:cNvPicPr>
-              <a:picLocks noChangeAspect="1"/>
-            </p:cNvPicPr>
-            <p:nvPr/>
-          </p:nvPicPr>
-          <p:blipFill>
-            <a:blip r:embed="rId2"/>
-            <a:stretch>
-              <a:fillRect/>
-            </a:stretch>
-          </p:blipFill>
-          <p:spPr>
-            <a:xfrm>
-              <a:off x="9064781" y="3792175"/>
-              <a:ext cx="1031690" cy="436421"/>
-            </a:xfrm>
-            <a:prstGeom prst="rect">
-              <a:avLst/>
-            </a:prstGeom>
-            <a:scene3d>
-              <a:camera prst="isometricOffAxis1Right"/>
-              <a:lightRig rig="threePt" dir="t"/>
-            </a:scene3d>
-          </p:spPr>
-        </p:pic>
-        <p:pic>
-          <p:nvPicPr>
-            <p:cNvPr id="63" name="Picture 62">
-              <a:extLst>
-                <a:ext uri="{FF2B5EF4-FFF2-40B4-BE49-F238E27FC236}">
-                  <a16:creationId xmlns:a16="http://schemas.microsoft.com/office/drawing/2014/main" id="{AD92E49A-7139-DDA9-FE30-4BB696D37852}"/>
-                </a:ext>
-              </a:extLst>
-            </p:cNvPr>
-            <p:cNvPicPr>
-              <a:picLocks noChangeAspect="1"/>
-            </p:cNvPicPr>
-            <p:nvPr/>
-          </p:nvPicPr>
-          <p:blipFill>
-            <a:blip r:embed="rId2"/>
-            <a:stretch>
-              <a:fillRect/>
-            </a:stretch>
-          </p:blipFill>
-          <p:spPr>
-            <a:xfrm>
-              <a:off x="9064781" y="4401974"/>
-              <a:ext cx="1031690" cy="436421"/>
-            </a:xfrm>
-            <a:prstGeom prst="rect">
-              <a:avLst/>
-            </a:prstGeom>
-            <a:scene3d>
-              <a:camera prst="isometricOffAxis1Right"/>
-              <a:lightRig rig="threePt" dir="t"/>
-            </a:scene3d>
-          </p:spPr>
-        </p:pic>
-      </p:grpSp>
-      <p:grpSp>
-        <p:nvGrpSpPr>
           <p:cNvPr id="86" name="Group 85">
             <a:extLst>
               <a:ext uri="{FF2B5EF4-FFF2-40B4-BE49-F238E27FC236}">
@@ -24927,10 +24391,10 @@
         </p:nvGrpSpPr>
         <p:grpSpPr>
           <a:xfrm>
-            <a:off x="379396" y="1048090"/>
-            <a:ext cx="4753889" cy="2380910"/>
-            <a:chOff x="817513" y="717181"/>
-            <a:chExt cx="4753889" cy="2380910"/>
+            <a:off x="379396" y="1036355"/>
+            <a:ext cx="4753889" cy="2392645"/>
+            <a:chOff x="817513" y="705446"/>
+            <a:chExt cx="4753889" cy="2392645"/>
           </a:xfrm>
         </p:grpSpPr>
         <p:sp>
@@ -25156,8 +24620,8 @@
           </p:nvSpPr>
           <p:spPr>
             <a:xfrm>
-              <a:off x="1163718" y="717181"/>
-              <a:ext cx="3884261" cy="646331"/>
+              <a:off x="1004766" y="705446"/>
+              <a:ext cx="4266527" cy="646331"/>
             </a:xfrm>
             <a:prstGeom prst="rect">
               <a:avLst/>
@@ -25181,7 +24645,37 @@
                     <a:schemeClr val="bg1"/>
                   </a:solidFill>
                 </a:rPr>
-                <a:t>Hardware, scale, cloud, multi-vendors, indexing, storage, replication, concurrency, recovery, distributed systems,  materialisation…</a:t>
+                <a:t>Hardware, scale, cloud, multi-vendors, indexing, storage,</a:t>
+              </a:r>
+              <a:br>
+                <a:rPr lang="en-AU" sz="1200" dirty="0">
+                  <a:solidFill>
+                    <a:schemeClr val="bg1"/>
+                  </a:solidFill>
+                </a:rPr>
+              </a:br>
+              <a:r>
+                <a:rPr lang="en-AU" sz="1200" dirty="0">
+                  <a:solidFill>
+                    <a:schemeClr val="bg1"/>
+                  </a:solidFill>
+                </a:rPr>
+                <a:t>     replication, transactions, concurrency, recovery, distributed</a:t>
+              </a:r>
+              <a:br>
+                <a:rPr lang="en-AU" sz="1200" dirty="0">
+                  <a:solidFill>
+                    <a:schemeClr val="bg1"/>
+                  </a:solidFill>
+                </a:rPr>
+              </a:br>
+              <a:r>
+                <a:rPr lang="en-AU" sz="1200" dirty="0">
+                  <a:solidFill>
+                    <a:schemeClr val="bg1"/>
+                  </a:solidFill>
+                </a:rPr>
+                <a:t>         systems, materialisation, backup, …</a:t>
               </a:r>
             </a:p>
           </p:txBody>
@@ -25371,6 +24865,1101 @@
           </a:p>
         </p:txBody>
       </p:sp>
+      <p:grpSp>
+        <p:nvGrpSpPr>
+          <p:cNvPr id="7" name="Group 6">
+            <a:extLst>
+              <a:ext uri="{FF2B5EF4-FFF2-40B4-BE49-F238E27FC236}">
+                <a16:creationId xmlns:a16="http://schemas.microsoft.com/office/drawing/2014/main" id="{69DFD1F3-4882-8433-8638-0361F3D28D0C}"/>
+              </a:ext>
+            </a:extLst>
+          </p:cNvPr>
+          <p:cNvGrpSpPr/>
+          <p:nvPr/>
+        </p:nvGrpSpPr>
+        <p:grpSpPr>
+          <a:xfrm>
+            <a:off x="5252226" y="305301"/>
+            <a:ext cx="4875275" cy="2841275"/>
+            <a:chOff x="5252226" y="305301"/>
+            <a:chExt cx="4875275" cy="2841275"/>
+          </a:xfrm>
+        </p:grpSpPr>
+        <p:grpSp>
+          <p:nvGrpSpPr>
+            <p:cNvPr id="87" name="Group 86">
+              <a:extLst>
+                <a:ext uri="{FF2B5EF4-FFF2-40B4-BE49-F238E27FC236}">
+                  <a16:creationId xmlns:a16="http://schemas.microsoft.com/office/drawing/2014/main" id="{CAE53593-E0B9-139C-70BE-C8AFFA32AD83}"/>
+                </a:ext>
+              </a:extLst>
+            </p:cNvPr>
+            <p:cNvGrpSpPr/>
+            <p:nvPr/>
+          </p:nvGrpSpPr>
+          <p:grpSpPr>
+            <a:xfrm>
+              <a:off x="5549158" y="305301"/>
+              <a:ext cx="4578343" cy="2362160"/>
+              <a:chOff x="6508757" y="576311"/>
+              <a:chExt cx="4578343" cy="2362160"/>
+            </a:xfrm>
+          </p:grpSpPr>
+          <p:sp>
+            <p:nvSpPr>
+              <p:cNvPr id="14" name="Rectangle 13">
+                <a:extLst>
+                  <a:ext uri="{FF2B5EF4-FFF2-40B4-BE49-F238E27FC236}">
+                    <a16:creationId xmlns:a16="http://schemas.microsoft.com/office/drawing/2014/main" id="{2B4080B8-42F3-4F8D-FBB2-8CB777385CE7}"/>
+                  </a:ext>
+                </a:extLst>
+              </p:cNvPr>
+              <p:cNvSpPr/>
+              <p:nvPr/>
+            </p:nvSpPr>
+            <p:spPr>
+              <a:xfrm>
+                <a:off x="6812006" y="1113086"/>
+                <a:ext cx="4275094" cy="1825385"/>
+              </a:xfrm>
+              <a:prstGeom prst="rect">
+                <a:avLst/>
+              </a:prstGeom>
+              <a:solidFill>
+                <a:srgbClr val="7030A0">
+                  <a:alpha val="30980"/>
+                </a:srgbClr>
+              </a:solidFill>
+              <a:scene3d>
+                <a:camera prst="isometricOffAxis1Right"/>
+                <a:lightRig rig="threePt" dir="t"/>
+              </a:scene3d>
+              <a:sp3d extrusionH="1803400"/>
+            </p:spPr>
+            <p:style>
+              <a:lnRef idx="2">
+                <a:schemeClr val="accent1">
+                  <a:shade val="50000"/>
+                </a:schemeClr>
+              </a:lnRef>
+              <a:fillRef idx="1">
+                <a:schemeClr val="accent1"/>
+              </a:fillRef>
+              <a:effectRef idx="0">
+                <a:schemeClr val="accent1"/>
+              </a:effectRef>
+              <a:fontRef idx="minor">
+                <a:schemeClr val="lt1"/>
+              </a:fontRef>
+            </p:style>
+            <p:txBody>
+              <a:bodyPr rtlCol="0" anchor="ctr"/>
+              <a:lstStyle/>
+              <a:p>
+                <a:pPr algn="ctr"/>
+                <a:endParaRPr lang="en-AU"/>
+              </a:p>
+            </p:txBody>
+          </p:sp>
+          <p:pic>
+            <p:nvPicPr>
+              <p:cNvPr id="15" name="Picture 14">
+                <a:extLst>
+                  <a:ext uri="{FF2B5EF4-FFF2-40B4-BE49-F238E27FC236}">
+                    <a16:creationId xmlns:a16="http://schemas.microsoft.com/office/drawing/2014/main" id="{F466AE72-54D8-447C-43C4-C50DB237B69C}"/>
+                  </a:ext>
+                </a:extLst>
+              </p:cNvPr>
+              <p:cNvPicPr>
+                <a:picLocks noChangeAspect="1"/>
+              </p:cNvPicPr>
+              <p:nvPr/>
+            </p:nvPicPr>
+            <p:blipFill>
+              <a:blip r:embed="rId2"/>
+              <a:stretch>
+                <a:fillRect/>
+              </a:stretch>
+            </p:blipFill>
+            <p:spPr>
+              <a:xfrm>
+                <a:off x="8352450" y="1131684"/>
+                <a:ext cx="2015528" cy="852600"/>
+              </a:xfrm>
+              <a:prstGeom prst="rect">
+                <a:avLst/>
+              </a:prstGeom>
+              <a:solidFill>
+                <a:srgbClr val="7030A0">
+                  <a:alpha val="30980"/>
+                </a:srgbClr>
+              </a:solidFill>
+              <a:scene3d>
+                <a:camera prst="isometricOffAxis1Right"/>
+                <a:lightRig rig="threePt" dir="t"/>
+              </a:scene3d>
+            </p:spPr>
+          </p:pic>
+          <p:sp>
+            <p:nvSpPr>
+              <p:cNvPr id="32" name="TextBox 31">
+                <a:extLst>
+                  <a:ext uri="{FF2B5EF4-FFF2-40B4-BE49-F238E27FC236}">
+                    <a16:creationId xmlns:a16="http://schemas.microsoft.com/office/drawing/2014/main" id="{D5F7E915-F4BF-CADF-ECD7-9DA2EED5F1B5}"/>
+                  </a:ext>
+                </a:extLst>
+              </p:cNvPr>
+              <p:cNvSpPr txBox="1"/>
+              <p:nvPr/>
+            </p:nvSpPr>
+            <p:spPr>
+              <a:xfrm>
+                <a:off x="7599456" y="2222271"/>
+                <a:ext cx="2757293" cy="584775"/>
+              </a:xfrm>
+              <a:prstGeom prst="rect">
+                <a:avLst/>
+              </a:prstGeom>
+              <a:solidFill>
+                <a:srgbClr val="7F7F7F">
+                  <a:alpha val="38039"/>
+                </a:srgbClr>
+              </a:solidFill>
+              <a:scene3d>
+                <a:camera prst="isometricOffAxis1Right"/>
+                <a:lightRig rig="threePt" dir="t"/>
+              </a:scene3d>
+            </p:spPr>
+            <p:txBody>
+              <a:bodyPr wrap="none" rtlCol="0">
+                <a:spAutoFit/>
+              </a:bodyPr>
+              <a:lstStyle/>
+              <a:p>
+                <a:pPr algn="ctr"/>
+                <a:r>
+                  <a:rPr lang="en-AU" sz="1600" dirty="0"/>
+                  <a:t>Intensionally Defined Relations</a:t>
+                </a:r>
+                <a:br>
+                  <a:rPr lang="en-AU" sz="1600" dirty="0"/>
+                </a:br>
+                <a:r>
+                  <a:rPr lang="en-AU" sz="1600" dirty="0"/>
+                  <a:t>(Rules)</a:t>
+                </a:r>
+              </a:p>
+            </p:txBody>
+          </p:sp>
+          <p:pic>
+            <p:nvPicPr>
+              <p:cNvPr id="41" name="Picture 40">
+                <a:extLst>
+                  <a:ext uri="{FF2B5EF4-FFF2-40B4-BE49-F238E27FC236}">
+                    <a16:creationId xmlns:a16="http://schemas.microsoft.com/office/drawing/2014/main" id="{FB707429-710A-D467-C4EB-D3B65485D3A1}"/>
+                  </a:ext>
+                </a:extLst>
+              </p:cNvPr>
+              <p:cNvPicPr>
+                <a:picLocks noChangeAspect="1"/>
+              </p:cNvPicPr>
+              <p:nvPr/>
+            </p:nvPicPr>
+            <p:blipFill>
+              <a:blip r:embed="rId2"/>
+              <a:stretch>
+                <a:fillRect/>
+              </a:stretch>
+            </p:blipFill>
+            <p:spPr>
+              <a:xfrm>
+                <a:off x="7083611" y="1454069"/>
+                <a:ext cx="1031690" cy="436421"/>
+              </a:xfrm>
+              <a:prstGeom prst="rect">
+                <a:avLst/>
+              </a:prstGeom>
+              <a:scene3d>
+                <a:camera prst="isometricOffAxis1Right"/>
+                <a:lightRig rig="threePt" dir="t"/>
+              </a:scene3d>
+            </p:spPr>
+          </p:pic>
+          <p:sp>
+            <p:nvSpPr>
+              <p:cNvPr id="50" name="TextBox 49">
+                <a:extLst>
+                  <a:ext uri="{FF2B5EF4-FFF2-40B4-BE49-F238E27FC236}">
+                    <a16:creationId xmlns:a16="http://schemas.microsoft.com/office/drawing/2014/main" id="{BCAFEC12-1DA4-76B6-0B88-08E038EEFD7B}"/>
+                  </a:ext>
+                </a:extLst>
+              </p:cNvPr>
+              <p:cNvSpPr txBox="1"/>
+              <p:nvPr/>
+            </p:nvSpPr>
+            <p:spPr>
+              <a:xfrm>
+                <a:off x="6508757" y="576311"/>
+                <a:ext cx="4227155" cy="646331"/>
+              </a:xfrm>
+              <a:prstGeom prst="rect">
+                <a:avLst/>
+              </a:prstGeom>
+              <a:noFill/>
+              <a:scene3d>
+                <a:camera prst="isometricOffAxis1Right"/>
+                <a:lightRig rig="threePt" dir="t"/>
+              </a:scene3d>
+            </p:spPr>
+            <p:txBody>
+              <a:bodyPr wrap="square">
+                <a:spAutoFit/>
+              </a:bodyPr>
+              <a:lstStyle/>
+              <a:p>
+                <a:pPr lvl="0"/>
+                <a:r>
+                  <a:rPr lang="en-AU" sz="1200" dirty="0">
+                    <a:solidFill>
+                      <a:schemeClr val="bg1"/>
+                    </a:solidFill>
+                  </a:rPr>
+                  <a:t>Logic, Constraints, Search, SMT Solvers, Numerical Methods,</a:t>
+                </a:r>
+                <a:br>
+                  <a:rPr lang="en-AU" sz="1200" dirty="0">
+                    <a:solidFill>
+                      <a:schemeClr val="bg1"/>
+                    </a:solidFill>
+                  </a:rPr>
+                </a:br>
+                <a:r>
+                  <a:rPr lang="en-AU" sz="1200" dirty="0">
+                    <a:solidFill>
+                      <a:schemeClr val="bg1"/>
+                    </a:solidFill>
+                  </a:rPr>
+                  <a:t>     Linear Programming, Symbolic Computation, Termination,</a:t>
+                </a:r>
+                <a:br>
+                  <a:rPr lang="en-AU" sz="1200" dirty="0">
+                    <a:solidFill>
+                      <a:schemeClr val="bg1"/>
+                    </a:solidFill>
+                  </a:rPr>
+                </a:br>
+                <a:r>
+                  <a:rPr lang="en-AU" sz="1200" dirty="0">
+                    <a:solidFill>
+                      <a:schemeClr val="bg1"/>
+                    </a:solidFill>
+                  </a:rPr>
+                  <a:t>         Negation, Stratification, Type Theory, Multiple Semantics </a:t>
+                </a:r>
+              </a:p>
+            </p:txBody>
+          </p:sp>
+        </p:grpSp>
+        <p:sp>
+          <p:nvSpPr>
+            <p:cNvPr id="3" name="TextBox 2">
+              <a:extLst>
+                <a:ext uri="{FF2B5EF4-FFF2-40B4-BE49-F238E27FC236}">
+                  <a16:creationId xmlns:a16="http://schemas.microsoft.com/office/drawing/2014/main" id="{72B9F781-70FD-6179-47B5-0707884D9D1A}"/>
+                </a:ext>
+              </a:extLst>
+            </p:cNvPr>
+            <p:cNvSpPr txBox="1"/>
+            <p:nvPr/>
+          </p:nvSpPr>
+          <p:spPr>
+            <a:xfrm>
+              <a:off x="5252226" y="838252"/>
+              <a:ext cx="1017916" cy="2308324"/>
+            </a:xfrm>
+            <a:prstGeom prst="rect">
+              <a:avLst/>
+            </a:prstGeom>
+            <a:noFill/>
+            <a:scene3d>
+              <a:camera prst="isometricLeftDown"/>
+              <a:lightRig rig="threePt" dir="t"/>
+            </a:scene3d>
+          </p:spPr>
+          <p:txBody>
+            <a:bodyPr wrap="square" rtlCol="0">
+              <a:spAutoFit/>
+            </a:bodyPr>
+            <a:lstStyle/>
+            <a:p>
+              <a:r>
+                <a:rPr lang="en-AU" sz="2400" b="1" kern="0" dirty="0">
+                  <a:solidFill>
+                    <a:schemeClr val="accent1">
+                      <a:lumMod val="60000"/>
+                      <a:lumOff val="40000"/>
+                    </a:schemeClr>
+                  </a:solidFill>
+                  <a:effectLst/>
+                  <a:latin typeface="Cambria Math" panose="02040503050406030204" pitchFamily="18" charset="0"/>
+                  <a:ea typeface="Times New Roman" panose="02020603050405020304" pitchFamily="18" charset="0"/>
+                  <a:cs typeface="Cambria Math" panose="02040503050406030204" pitchFamily="18" charset="0"/>
+                </a:rPr>
+                <a:t>⇒</a:t>
+              </a:r>
+              <a:r>
+                <a:rPr lang="en-AU" sz="2400" b="1" kern="0" dirty="0">
+                  <a:solidFill>
+                    <a:schemeClr val="accent1">
+                      <a:lumMod val="60000"/>
+                      <a:lumOff val="40000"/>
+                    </a:schemeClr>
+                  </a:solidFill>
+                  <a:effectLst/>
+                  <a:latin typeface="Arial" panose="020B0604020202020204" pitchFamily="34" charset="0"/>
+                  <a:ea typeface="Times New Roman" panose="02020603050405020304" pitchFamily="18" charset="0"/>
+                  <a:cs typeface="Times New Roman" panose="02020603050405020304" pitchFamily="18" charset="0"/>
+                </a:rPr>
+                <a:t> </a:t>
+              </a:r>
+              <a:r>
+                <a:rPr lang="en-AU" sz="2400" b="1" kern="0" dirty="0">
+                  <a:solidFill>
+                    <a:schemeClr val="accent1">
+                      <a:lumMod val="60000"/>
+                      <a:lumOff val="40000"/>
+                    </a:schemeClr>
+                  </a:solidFill>
+                  <a:effectLst/>
+                  <a:latin typeface="Cambria Math" panose="02040503050406030204" pitchFamily="18" charset="0"/>
+                  <a:ea typeface="Times New Roman" panose="02020603050405020304" pitchFamily="18" charset="0"/>
+                  <a:cs typeface="Cambria Math" panose="02040503050406030204" pitchFamily="18" charset="0"/>
+                </a:rPr>
+                <a:t>⇔</a:t>
+              </a:r>
+              <a:r>
+                <a:rPr lang="en-AU" sz="2400" b="1" kern="0" dirty="0">
+                  <a:solidFill>
+                    <a:schemeClr val="accent1">
+                      <a:lumMod val="60000"/>
+                      <a:lumOff val="40000"/>
+                    </a:schemeClr>
+                  </a:solidFill>
+                  <a:effectLst/>
+                  <a:latin typeface="Arial" panose="020B0604020202020204" pitchFamily="34" charset="0"/>
+                  <a:ea typeface="Times New Roman" panose="02020603050405020304" pitchFamily="18" charset="0"/>
+                  <a:cs typeface="Times New Roman" panose="02020603050405020304" pitchFamily="18" charset="0"/>
+                </a:rPr>
+                <a:t> ¬ </a:t>
+              </a:r>
+              <a:r>
+                <a:rPr lang="en-AU" sz="2400" b="1" kern="0" dirty="0">
+                  <a:solidFill>
+                    <a:schemeClr val="accent1">
+                      <a:lumMod val="60000"/>
+                      <a:lumOff val="40000"/>
+                    </a:schemeClr>
+                  </a:solidFill>
+                  <a:effectLst/>
+                  <a:latin typeface="Cambria Math" panose="02040503050406030204" pitchFamily="18" charset="0"/>
+                  <a:ea typeface="Times New Roman" panose="02020603050405020304" pitchFamily="18" charset="0"/>
+                  <a:cs typeface="Cambria Math" panose="02040503050406030204" pitchFamily="18" charset="0"/>
+                </a:rPr>
+                <a:t>∧</a:t>
+              </a:r>
+              <a:r>
+                <a:rPr lang="en-AU" sz="2400" b="1" kern="0" dirty="0">
+                  <a:solidFill>
+                    <a:schemeClr val="accent1">
+                      <a:lumMod val="60000"/>
+                      <a:lumOff val="40000"/>
+                    </a:schemeClr>
+                  </a:solidFill>
+                  <a:effectLst/>
+                  <a:latin typeface="Arial" panose="020B0604020202020204" pitchFamily="34" charset="0"/>
+                  <a:ea typeface="Times New Roman" panose="02020603050405020304" pitchFamily="18" charset="0"/>
+                  <a:cs typeface="Times New Roman" panose="02020603050405020304" pitchFamily="18" charset="0"/>
+                </a:rPr>
+                <a:t> </a:t>
+              </a:r>
+              <a:r>
+                <a:rPr lang="en-AU" sz="2400" b="1" kern="0" dirty="0">
+                  <a:solidFill>
+                    <a:schemeClr val="accent1">
+                      <a:lumMod val="60000"/>
+                      <a:lumOff val="40000"/>
+                    </a:schemeClr>
+                  </a:solidFill>
+                  <a:effectLst/>
+                  <a:latin typeface="Cambria Math" panose="02040503050406030204" pitchFamily="18" charset="0"/>
+                  <a:ea typeface="Times New Roman" panose="02020603050405020304" pitchFamily="18" charset="0"/>
+                  <a:cs typeface="Cambria Math" panose="02040503050406030204" pitchFamily="18" charset="0"/>
+                </a:rPr>
+                <a:t>∨</a:t>
+              </a:r>
+              <a:r>
+                <a:rPr lang="en-AU" sz="2400" b="1" kern="0" dirty="0">
+                  <a:solidFill>
+                    <a:schemeClr val="accent1">
+                      <a:lumMod val="60000"/>
+                      <a:lumOff val="40000"/>
+                    </a:schemeClr>
+                  </a:solidFill>
+                  <a:effectLst/>
+                  <a:latin typeface="Arial" panose="020B0604020202020204" pitchFamily="34" charset="0"/>
+                  <a:ea typeface="Times New Roman" panose="02020603050405020304" pitchFamily="18" charset="0"/>
+                  <a:cs typeface="Times New Roman" panose="02020603050405020304" pitchFamily="18" charset="0"/>
+                </a:rPr>
+                <a:t> </a:t>
+              </a:r>
+              <a:r>
+                <a:rPr lang="en-AU" sz="2400" b="1" kern="0" dirty="0">
+                  <a:solidFill>
+                    <a:schemeClr val="accent1">
+                      <a:lumMod val="60000"/>
+                      <a:lumOff val="40000"/>
+                    </a:schemeClr>
+                  </a:solidFill>
+                  <a:effectLst/>
+                  <a:latin typeface="Cambria Math" panose="02040503050406030204" pitchFamily="18" charset="0"/>
+                  <a:ea typeface="Times New Roman" panose="02020603050405020304" pitchFamily="18" charset="0"/>
+                  <a:cs typeface="Cambria Math" panose="02040503050406030204" pitchFamily="18" charset="0"/>
+                </a:rPr>
+                <a:t>∀</a:t>
+              </a:r>
+              <a:r>
+                <a:rPr lang="en-AU" sz="2400" b="1" kern="0" dirty="0">
+                  <a:solidFill>
+                    <a:schemeClr val="accent1">
+                      <a:lumMod val="60000"/>
+                      <a:lumOff val="40000"/>
+                    </a:schemeClr>
+                  </a:solidFill>
+                  <a:effectLst/>
+                  <a:latin typeface="Arial" panose="020B0604020202020204" pitchFamily="34" charset="0"/>
+                  <a:ea typeface="Times New Roman" panose="02020603050405020304" pitchFamily="18" charset="0"/>
+                  <a:cs typeface="Times New Roman" panose="02020603050405020304" pitchFamily="18" charset="0"/>
+                </a:rPr>
+                <a:t> </a:t>
+              </a:r>
+              <a:r>
+                <a:rPr lang="en-AU" sz="2400" b="1" kern="0" dirty="0">
+                  <a:solidFill>
+                    <a:schemeClr val="accent1">
+                      <a:lumMod val="60000"/>
+                      <a:lumOff val="40000"/>
+                    </a:schemeClr>
+                  </a:solidFill>
+                  <a:effectLst/>
+                  <a:latin typeface="Cambria Math" panose="02040503050406030204" pitchFamily="18" charset="0"/>
+                  <a:ea typeface="Times New Roman" panose="02020603050405020304" pitchFamily="18" charset="0"/>
+                  <a:cs typeface="Cambria Math" panose="02040503050406030204" pitchFamily="18" charset="0"/>
+                </a:rPr>
+                <a:t>∃</a:t>
+              </a:r>
+              <a:r>
+                <a:rPr lang="en-AU" sz="2400" b="1" kern="0" dirty="0">
+                  <a:solidFill>
+                    <a:schemeClr val="accent1">
+                      <a:lumMod val="60000"/>
+                      <a:lumOff val="40000"/>
+                    </a:schemeClr>
+                  </a:solidFill>
+                  <a:effectLst/>
+                  <a:latin typeface="Arial" panose="020B0604020202020204" pitchFamily="34" charset="0"/>
+                  <a:ea typeface="Times New Roman" panose="02020603050405020304" pitchFamily="18" charset="0"/>
+                  <a:cs typeface="Times New Roman" panose="02020603050405020304" pitchFamily="18" charset="0"/>
+                </a:rPr>
+                <a:t> ! </a:t>
+              </a:r>
+              <a:r>
+                <a:rPr lang="en-AU" sz="2400" b="1" kern="0" dirty="0">
+                  <a:solidFill>
+                    <a:schemeClr val="accent1">
+                      <a:lumMod val="60000"/>
+                      <a:lumOff val="40000"/>
+                    </a:schemeClr>
+                  </a:solidFill>
+                  <a:effectLst/>
+                  <a:latin typeface="Cambria Math" panose="02040503050406030204" pitchFamily="18" charset="0"/>
+                  <a:ea typeface="Times New Roman" panose="02020603050405020304" pitchFamily="18" charset="0"/>
+                  <a:cs typeface="Cambria Math" panose="02040503050406030204" pitchFamily="18" charset="0"/>
+                </a:rPr>
+                <a:t>≔</a:t>
+              </a:r>
+              <a:r>
+                <a:rPr lang="en-AU" sz="2400" b="1" kern="0" dirty="0">
+                  <a:solidFill>
+                    <a:schemeClr val="accent1">
+                      <a:lumMod val="60000"/>
+                      <a:lumOff val="40000"/>
+                    </a:schemeClr>
+                  </a:solidFill>
+                  <a:effectLst/>
+                  <a:latin typeface="Arial" panose="020B0604020202020204" pitchFamily="34" charset="0"/>
+                  <a:ea typeface="Times New Roman" panose="02020603050405020304" pitchFamily="18" charset="0"/>
+                  <a:cs typeface="Times New Roman" panose="02020603050405020304" pitchFamily="18" charset="0"/>
+                </a:rPr>
+                <a:t> </a:t>
+              </a:r>
+              <a:r>
+                <a:rPr lang="en-AU" sz="2400" b="1" kern="0" dirty="0">
+                  <a:solidFill>
+                    <a:schemeClr val="accent1">
+                      <a:lumMod val="60000"/>
+                      <a:lumOff val="40000"/>
+                    </a:schemeClr>
+                  </a:solidFill>
+                  <a:effectLst/>
+                  <a:latin typeface="Cambria Math" panose="02040503050406030204" pitchFamily="18" charset="0"/>
+                  <a:ea typeface="Times New Roman" panose="02020603050405020304" pitchFamily="18" charset="0"/>
+                  <a:cs typeface="Cambria Math" panose="02040503050406030204" pitchFamily="18" charset="0"/>
+                </a:rPr>
+                <a:t>⊢</a:t>
+              </a:r>
+              <a:r>
+                <a:rPr lang="en-AU" sz="2400" b="1" kern="0" dirty="0">
+                  <a:solidFill>
+                    <a:schemeClr val="accent1">
+                      <a:lumMod val="60000"/>
+                      <a:lumOff val="40000"/>
+                    </a:schemeClr>
+                  </a:solidFill>
+                  <a:effectLst/>
+                  <a:latin typeface="Arial" panose="020B0604020202020204" pitchFamily="34" charset="0"/>
+                  <a:ea typeface="Times New Roman" panose="02020603050405020304" pitchFamily="18" charset="0"/>
+                  <a:cs typeface="Times New Roman" panose="02020603050405020304" pitchFamily="18" charset="0"/>
+                </a:rPr>
+                <a:t> </a:t>
+              </a:r>
+              <a:r>
+                <a:rPr lang="en-AU" sz="2400" b="1" kern="0" dirty="0">
+                  <a:solidFill>
+                    <a:schemeClr val="accent1">
+                      <a:lumMod val="60000"/>
+                      <a:lumOff val="40000"/>
+                    </a:schemeClr>
+                  </a:solidFill>
+                  <a:effectLst/>
+                  <a:latin typeface="Cambria Math" panose="02040503050406030204" pitchFamily="18" charset="0"/>
+                  <a:ea typeface="Times New Roman" panose="02020603050405020304" pitchFamily="18" charset="0"/>
+                  <a:cs typeface="Cambria Math" panose="02040503050406030204" pitchFamily="18" charset="0"/>
+                </a:rPr>
+                <a:t>⊨</a:t>
+              </a:r>
+              <a:r>
+                <a:rPr lang="en-AU" sz="2400" b="1" kern="0" dirty="0">
+                  <a:solidFill>
+                    <a:schemeClr val="accent1">
+                      <a:lumMod val="60000"/>
+                      <a:lumOff val="40000"/>
+                    </a:schemeClr>
+                  </a:solidFill>
+                  <a:effectLst/>
+                  <a:latin typeface="Arial" panose="020B0604020202020204" pitchFamily="34" charset="0"/>
+                  <a:ea typeface="Times New Roman" panose="02020603050405020304" pitchFamily="18" charset="0"/>
+                  <a:cs typeface="Times New Roman" panose="02020603050405020304" pitchFamily="18" charset="0"/>
+                </a:rPr>
+                <a:t> </a:t>
+              </a:r>
+              <a:r>
+                <a:rPr lang="en-AU" sz="2400" kern="100" dirty="0">
+                  <a:solidFill>
+                    <a:schemeClr val="accent1">
+                      <a:lumMod val="60000"/>
+                      <a:lumOff val="40000"/>
+                    </a:schemeClr>
+                  </a:solidFill>
+                  <a:effectLst/>
+                  <a:latin typeface="Calibri" panose="020F0502020204030204" pitchFamily="34" charset="0"/>
+                  <a:ea typeface="Calibri" panose="020F0502020204030204" pitchFamily="34" charset="0"/>
+                  <a:cs typeface="Times New Roman" panose="02020603050405020304" pitchFamily="18" charset="0"/>
+                </a:rPr>
+                <a:t> </a:t>
+              </a:r>
+            </a:p>
+            <a:p>
+              <a:endParaRPr lang="en-AU" sz="2400" dirty="0">
+                <a:solidFill>
+                  <a:schemeClr val="accent1">
+                    <a:lumMod val="60000"/>
+                    <a:lumOff val="40000"/>
+                  </a:schemeClr>
+                </a:solidFill>
+              </a:endParaRPr>
+            </a:p>
+          </p:txBody>
+        </p:sp>
+      </p:grpSp>
+      <p:grpSp>
+        <p:nvGrpSpPr>
+          <p:cNvPr id="6" name="Group 5">
+            <a:extLst>
+              <a:ext uri="{FF2B5EF4-FFF2-40B4-BE49-F238E27FC236}">
+                <a16:creationId xmlns:a16="http://schemas.microsoft.com/office/drawing/2014/main" id="{4CB4A785-DD59-6E3D-8A86-C6B36A64D744}"/>
+              </a:ext>
+            </a:extLst>
+          </p:cNvPr>
+          <p:cNvGrpSpPr/>
+          <p:nvPr/>
+        </p:nvGrpSpPr>
+        <p:grpSpPr>
+          <a:xfrm>
+            <a:off x="5579699" y="3429000"/>
+            <a:ext cx="6547323" cy="2980218"/>
+            <a:chOff x="5587042" y="3429300"/>
+            <a:chExt cx="6547323" cy="2980218"/>
+          </a:xfrm>
+        </p:grpSpPr>
+        <p:grpSp>
+          <p:nvGrpSpPr>
+            <p:cNvPr id="88" name="Group 87">
+              <a:extLst>
+                <a:ext uri="{FF2B5EF4-FFF2-40B4-BE49-F238E27FC236}">
+                  <a16:creationId xmlns:a16="http://schemas.microsoft.com/office/drawing/2014/main" id="{B317216B-3692-9959-E8B5-8A7A18E4748D}"/>
+                </a:ext>
+              </a:extLst>
+            </p:cNvPr>
+            <p:cNvGrpSpPr/>
+            <p:nvPr/>
+          </p:nvGrpSpPr>
+          <p:grpSpPr>
+            <a:xfrm>
+              <a:off x="6107952" y="3429300"/>
+              <a:ext cx="6026413" cy="2980218"/>
+              <a:chOff x="5746685" y="3283686"/>
+              <a:chExt cx="4794382" cy="2980218"/>
+            </a:xfrm>
+          </p:grpSpPr>
+          <p:sp>
+            <p:nvSpPr>
+              <p:cNvPr id="2" name="Rectangle 1">
+                <a:extLst>
+                  <a:ext uri="{FF2B5EF4-FFF2-40B4-BE49-F238E27FC236}">
+                    <a16:creationId xmlns:a16="http://schemas.microsoft.com/office/drawing/2014/main" id="{0A9D2A6D-12CF-41CA-9B39-4855A57C3F80}"/>
+                  </a:ext>
+                </a:extLst>
+              </p:cNvPr>
+              <p:cNvSpPr/>
+              <p:nvPr/>
+            </p:nvSpPr>
+            <p:spPr>
+              <a:xfrm>
+                <a:off x="5746685" y="3770185"/>
+                <a:ext cx="4794382" cy="2493719"/>
+              </a:xfrm>
+              <a:prstGeom prst="rect">
+                <a:avLst/>
+              </a:prstGeom>
+              <a:solidFill>
+                <a:schemeClr val="accent6">
+                  <a:lumMod val="60000"/>
+                  <a:lumOff val="40000"/>
+                </a:schemeClr>
+              </a:solidFill>
+              <a:scene3d>
+                <a:camera prst="isometricOffAxis1Right"/>
+                <a:lightRig rig="threePt" dir="t"/>
+              </a:scene3d>
+              <a:sp3d extrusionH="1803400"/>
+            </p:spPr>
+            <p:style>
+              <a:lnRef idx="2">
+                <a:schemeClr val="accent1">
+                  <a:shade val="50000"/>
+                </a:schemeClr>
+              </a:lnRef>
+              <a:fillRef idx="1">
+                <a:schemeClr val="accent1"/>
+              </a:fillRef>
+              <a:effectRef idx="0">
+                <a:schemeClr val="accent1"/>
+              </a:effectRef>
+              <a:fontRef idx="minor">
+                <a:schemeClr val="lt1"/>
+              </a:fontRef>
+            </p:style>
+            <p:txBody>
+              <a:bodyPr rtlCol="0" anchor="ctr"/>
+              <a:lstStyle/>
+              <a:p>
+                <a:pPr algn="ctr"/>
+                <a:endParaRPr lang="en-AU"/>
+              </a:p>
+            </p:txBody>
+          </p:sp>
+          <p:pic>
+            <p:nvPicPr>
+              <p:cNvPr id="5" name="Picture 4">
+                <a:extLst>
+                  <a:ext uri="{FF2B5EF4-FFF2-40B4-BE49-F238E27FC236}">
+                    <a16:creationId xmlns:a16="http://schemas.microsoft.com/office/drawing/2014/main" id="{4DDBD2DF-BBB9-B531-19FD-F3E5D54946B1}"/>
+                  </a:ext>
+                </a:extLst>
+              </p:cNvPr>
+              <p:cNvPicPr>
+                <a:picLocks noChangeAspect="1"/>
+              </p:cNvPicPr>
+              <p:nvPr/>
+            </p:nvPicPr>
+            <p:blipFill>
+              <a:blip r:embed="rId2"/>
+              <a:stretch>
+                <a:fillRect/>
+              </a:stretch>
+            </p:blipFill>
+            <p:spPr>
+              <a:xfrm>
+                <a:off x="6032521" y="4099483"/>
+                <a:ext cx="2662710" cy="1240096"/>
+              </a:xfrm>
+              <a:prstGeom prst="rect">
+                <a:avLst/>
+              </a:prstGeom>
+              <a:solidFill>
+                <a:schemeClr val="accent6">
+                  <a:lumMod val="60000"/>
+                  <a:lumOff val="40000"/>
+                </a:schemeClr>
+              </a:solidFill>
+              <a:scene3d>
+                <a:camera prst="isometricOffAxis1Right"/>
+                <a:lightRig rig="threePt" dir="t"/>
+              </a:scene3d>
+            </p:spPr>
+          </p:pic>
+          <p:sp>
+            <p:nvSpPr>
+              <p:cNvPr id="19" name="TextBox 18">
+                <a:extLst>
+                  <a:ext uri="{FF2B5EF4-FFF2-40B4-BE49-F238E27FC236}">
+                    <a16:creationId xmlns:a16="http://schemas.microsoft.com/office/drawing/2014/main" id="{15AAA5EA-4BF5-C3B1-43B1-353DDA63A2D7}"/>
+                  </a:ext>
+                </a:extLst>
+              </p:cNvPr>
+              <p:cNvSpPr txBox="1"/>
+              <p:nvPr/>
+            </p:nvSpPr>
+            <p:spPr>
+              <a:xfrm>
+                <a:off x="6032521" y="3283686"/>
+                <a:ext cx="3548105" cy="646331"/>
+              </a:xfrm>
+              <a:prstGeom prst="rect">
+                <a:avLst/>
+              </a:prstGeom>
+              <a:noFill/>
+              <a:scene3d>
+                <a:camera prst="isometricOffAxis1Right"/>
+                <a:lightRig rig="threePt" dir="t"/>
+              </a:scene3d>
+            </p:spPr>
+            <p:txBody>
+              <a:bodyPr wrap="none" rtlCol="0">
+                <a:spAutoFit/>
+              </a:bodyPr>
+              <a:lstStyle/>
+              <a:p>
+                <a:r>
+                  <a:rPr lang="en-AU" dirty="0">
+                    <a:solidFill>
+                      <a:schemeClr val="bg1"/>
+                    </a:solidFill>
+                  </a:rPr>
+                  <a:t>Relational Queries with Fixed-Point Operators</a:t>
+                </a:r>
+              </a:p>
+              <a:p>
+                <a:pPr algn="ctr"/>
+                <a:r>
+                  <a:rPr lang="en-AU" dirty="0">
+                    <a:solidFill>
+                      <a:schemeClr val="bg1"/>
+                    </a:solidFill>
+                  </a:rPr>
+                  <a:t>SQL, Datalog, LINQ, PRQL, Morel, …</a:t>
+                </a:r>
+              </a:p>
+            </p:txBody>
+          </p:sp>
+          <p:sp>
+            <p:nvSpPr>
+              <p:cNvPr id="33" name="TextBox 32">
+                <a:extLst>
+                  <a:ext uri="{FF2B5EF4-FFF2-40B4-BE49-F238E27FC236}">
+                    <a16:creationId xmlns:a16="http://schemas.microsoft.com/office/drawing/2014/main" id="{9B8BEA76-225A-F196-32D0-7D3F0329890D}"/>
+                  </a:ext>
+                </a:extLst>
+              </p:cNvPr>
+              <p:cNvSpPr txBox="1"/>
+              <p:nvPr/>
+            </p:nvSpPr>
+            <p:spPr>
+              <a:xfrm>
+                <a:off x="6490991" y="5324894"/>
+                <a:ext cx="3548105" cy="830997"/>
+              </a:xfrm>
+              <a:prstGeom prst="rect">
+                <a:avLst/>
+              </a:prstGeom>
+              <a:solidFill>
+                <a:srgbClr val="7F7F7F">
+                  <a:alpha val="38039"/>
+                </a:srgbClr>
+              </a:solidFill>
+              <a:scene3d>
+                <a:camera prst="isometricOffAxis1Right"/>
+                <a:lightRig rig="threePt" dir="t"/>
+              </a:scene3d>
+            </p:spPr>
+            <p:txBody>
+              <a:bodyPr wrap="square" rtlCol="0">
+                <a:spAutoFit/>
+              </a:bodyPr>
+              <a:lstStyle/>
+              <a:p>
+                <a:pPr algn="ctr"/>
+                <a:r>
+                  <a:rPr lang="en-AU" sz="2400" dirty="0"/>
+                  <a:t>Derived Relations</a:t>
+                </a:r>
+                <a:br>
+                  <a:rPr lang="en-AU" sz="2400" dirty="0"/>
+                </a:br>
+                <a:r>
+                  <a:rPr lang="en-AU" sz="2400" dirty="0"/>
+                  <a:t>(Rules applied to Data)</a:t>
+                </a:r>
+              </a:p>
+            </p:txBody>
+          </p:sp>
+          <p:pic>
+            <p:nvPicPr>
+              <p:cNvPr id="10" name="Picture 9">
+                <a:extLst>
+                  <a:ext uri="{FF2B5EF4-FFF2-40B4-BE49-F238E27FC236}">
+                    <a16:creationId xmlns:a16="http://schemas.microsoft.com/office/drawing/2014/main" id="{9BA138B9-41C2-31B0-8185-978017F64334}"/>
+                  </a:ext>
+                </a:extLst>
+              </p:cNvPr>
+              <p:cNvPicPr>
+                <a:picLocks noChangeAspect="1"/>
+              </p:cNvPicPr>
+              <p:nvPr/>
+            </p:nvPicPr>
+            <p:blipFill>
+              <a:blip r:embed="rId2"/>
+              <a:stretch>
+                <a:fillRect/>
+              </a:stretch>
+            </p:blipFill>
+            <p:spPr>
+              <a:xfrm>
+                <a:off x="6647889" y="3985258"/>
+                <a:ext cx="2662710" cy="1240096"/>
+              </a:xfrm>
+              <a:prstGeom prst="rect">
+                <a:avLst/>
+              </a:prstGeom>
+              <a:solidFill>
+                <a:schemeClr val="accent6">
+                  <a:lumMod val="60000"/>
+                  <a:lumOff val="40000"/>
+                </a:schemeClr>
+              </a:solidFill>
+              <a:scene3d>
+                <a:camera prst="isometricOffAxis1Right"/>
+                <a:lightRig rig="threePt" dir="t"/>
+              </a:scene3d>
+            </p:spPr>
+          </p:pic>
+          <p:pic>
+            <p:nvPicPr>
+              <p:cNvPr id="11" name="Picture 10">
+                <a:extLst>
+                  <a:ext uri="{FF2B5EF4-FFF2-40B4-BE49-F238E27FC236}">
+                    <a16:creationId xmlns:a16="http://schemas.microsoft.com/office/drawing/2014/main" id="{36AABABC-9FFB-3E43-E2DC-0F62CBCA1565}"/>
+                  </a:ext>
+                </a:extLst>
+              </p:cNvPr>
+              <p:cNvPicPr>
+                <a:picLocks noChangeAspect="1"/>
+              </p:cNvPicPr>
+              <p:nvPr/>
+            </p:nvPicPr>
+            <p:blipFill>
+              <a:blip r:embed="rId2"/>
+              <a:stretch>
+                <a:fillRect/>
+              </a:stretch>
+            </p:blipFill>
+            <p:spPr>
+              <a:xfrm>
+                <a:off x="7263257" y="3877245"/>
+                <a:ext cx="2662710" cy="1240096"/>
+              </a:xfrm>
+              <a:prstGeom prst="rect">
+                <a:avLst/>
+              </a:prstGeom>
+              <a:solidFill>
+                <a:schemeClr val="accent6">
+                  <a:lumMod val="60000"/>
+                  <a:lumOff val="40000"/>
+                </a:schemeClr>
+              </a:solidFill>
+              <a:scene3d>
+                <a:camera prst="isometricOffAxis1Right"/>
+                <a:lightRig rig="threePt" dir="t"/>
+              </a:scene3d>
+            </p:spPr>
+          </p:pic>
+        </p:grpSp>
+        <p:sp>
+          <p:nvSpPr>
+            <p:cNvPr id="4" name="TextBox 3">
+              <a:extLst>
+                <a:ext uri="{FF2B5EF4-FFF2-40B4-BE49-F238E27FC236}">
+                  <a16:creationId xmlns:a16="http://schemas.microsoft.com/office/drawing/2014/main" id="{3C126DE3-AC48-0304-E259-867C7A07B35E}"/>
+                </a:ext>
+              </a:extLst>
+            </p:cNvPr>
+            <p:cNvSpPr txBox="1"/>
+            <p:nvPr/>
+          </p:nvSpPr>
+          <p:spPr>
+            <a:xfrm>
+              <a:off x="5587042" y="4292917"/>
+              <a:ext cx="1017916" cy="2062103"/>
+            </a:xfrm>
+            <a:prstGeom prst="rect">
+              <a:avLst/>
+            </a:prstGeom>
+            <a:noFill/>
+            <a:scene3d>
+              <a:camera prst="isometricLeftDown"/>
+              <a:lightRig rig="threePt" dir="t"/>
+            </a:scene3d>
+          </p:spPr>
+          <p:txBody>
+            <a:bodyPr wrap="square" rtlCol="0">
+              <a:spAutoFit/>
+            </a:bodyPr>
+            <a:lstStyle/>
+            <a:p>
+              <a:r>
+                <a:rPr lang="el-GR" sz="3200" b="1" kern="0" dirty="0">
+                  <a:solidFill>
+                    <a:schemeClr val="accent1">
+                      <a:lumMod val="60000"/>
+                      <a:lumOff val="40000"/>
+                    </a:schemeClr>
+                  </a:solidFill>
+                  <a:effectLst/>
+                  <a:latin typeface="Cambria Math" panose="02040503050406030204" pitchFamily="18" charset="0"/>
+                  <a:ea typeface="Times New Roman" panose="02020603050405020304" pitchFamily="18" charset="0"/>
+                  <a:cs typeface="Cambria Math" panose="02040503050406030204" pitchFamily="18" charset="0"/>
+                </a:rPr>
+                <a:t>σ π </a:t>
+              </a:r>
+              <a:br>
+                <a:rPr lang="en-AU" sz="3200" b="1" kern="0" dirty="0">
+                  <a:solidFill>
+                    <a:schemeClr val="accent1">
+                      <a:lumMod val="60000"/>
+                      <a:lumOff val="40000"/>
+                    </a:schemeClr>
+                  </a:solidFill>
+                  <a:effectLst/>
+                  <a:latin typeface="Cambria Math" panose="02040503050406030204" pitchFamily="18" charset="0"/>
+                  <a:ea typeface="Times New Roman" panose="02020603050405020304" pitchFamily="18" charset="0"/>
+                  <a:cs typeface="Cambria Math" panose="02040503050406030204" pitchFamily="18" charset="0"/>
+                </a:rPr>
+              </a:br>
+              <a:r>
+                <a:rPr lang="el-GR" sz="3200" b="1" kern="0" dirty="0">
+                  <a:solidFill>
+                    <a:schemeClr val="accent1">
+                      <a:lumMod val="60000"/>
+                      <a:lumOff val="40000"/>
+                    </a:schemeClr>
+                  </a:solidFill>
+                  <a:effectLst/>
+                  <a:latin typeface="Cambria Math" panose="02040503050406030204" pitchFamily="18" charset="0"/>
+                  <a:ea typeface="Times New Roman" panose="02020603050405020304" pitchFamily="18" charset="0"/>
+                  <a:cs typeface="Cambria Math" panose="02040503050406030204" pitchFamily="18" charset="0"/>
+                </a:rPr>
+                <a:t>ρ υ </a:t>
+              </a:r>
+              <a:br>
+                <a:rPr lang="en-AU" sz="3200" b="1" kern="0" dirty="0">
+                  <a:solidFill>
+                    <a:schemeClr val="accent1">
+                      <a:lumMod val="60000"/>
+                      <a:lumOff val="40000"/>
+                    </a:schemeClr>
+                  </a:solidFill>
+                  <a:effectLst/>
+                  <a:latin typeface="Cambria Math" panose="02040503050406030204" pitchFamily="18" charset="0"/>
+                  <a:ea typeface="Times New Roman" panose="02020603050405020304" pitchFamily="18" charset="0"/>
+                  <a:cs typeface="Cambria Math" panose="02040503050406030204" pitchFamily="18" charset="0"/>
+                </a:rPr>
+              </a:br>
+              <a:r>
+                <a:rPr lang="el-GR" sz="3200" b="1" kern="0" dirty="0">
+                  <a:solidFill>
+                    <a:schemeClr val="accent1">
+                      <a:lumMod val="60000"/>
+                      <a:lumOff val="40000"/>
+                    </a:schemeClr>
+                  </a:solidFill>
+                  <a:effectLst/>
+                  <a:latin typeface="Cambria Math" panose="02040503050406030204" pitchFamily="18" charset="0"/>
+                  <a:ea typeface="Times New Roman" panose="02020603050405020304" pitchFamily="18" charset="0"/>
+                  <a:cs typeface="Cambria Math" panose="02040503050406030204" pitchFamily="18" charset="0"/>
+                </a:rPr>
+                <a:t>– X </a:t>
+              </a:r>
+              <a:br>
+                <a:rPr lang="en-AU" sz="3200" b="1" kern="0" dirty="0">
+                  <a:solidFill>
+                    <a:schemeClr val="accent1">
+                      <a:lumMod val="60000"/>
+                      <a:lumOff val="40000"/>
+                    </a:schemeClr>
+                  </a:solidFill>
+                  <a:effectLst/>
+                  <a:latin typeface="Cambria Math" panose="02040503050406030204" pitchFamily="18" charset="0"/>
+                  <a:ea typeface="Times New Roman" panose="02020603050405020304" pitchFamily="18" charset="0"/>
+                  <a:cs typeface="Cambria Math" panose="02040503050406030204" pitchFamily="18" charset="0"/>
+                </a:rPr>
+              </a:br>
+              <a:r>
+                <a:rPr lang="el-GR" sz="3200" b="1" kern="0" dirty="0">
+                  <a:solidFill>
+                    <a:schemeClr val="accent1">
+                      <a:lumMod val="60000"/>
+                      <a:lumOff val="40000"/>
+                    </a:schemeClr>
+                  </a:solidFill>
+                  <a:effectLst/>
+                  <a:latin typeface="Cambria Math" panose="02040503050406030204" pitchFamily="18" charset="0"/>
+                  <a:ea typeface="Times New Roman" panose="02020603050405020304" pitchFamily="18" charset="0"/>
+                  <a:cs typeface="Cambria Math" panose="02040503050406030204" pitchFamily="18" charset="0"/>
+                </a:rPr>
+                <a:t>⋈</a:t>
+              </a:r>
+              <a:endParaRPr lang="en-AU" sz="3200" dirty="0">
+                <a:solidFill>
+                  <a:schemeClr val="accent1">
+                    <a:lumMod val="60000"/>
+                    <a:lumOff val="40000"/>
+                  </a:schemeClr>
+                </a:solidFill>
+              </a:endParaRPr>
+            </a:p>
+          </p:txBody>
+        </p:sp>
+      </p:grpSp>
     </p:spTree>
     <p:extLst>
       <p:ext uri="{BB962C8B-B14F-4D97-AF65-F5344CB8AC3E}">

</xml_diff>

<commit_message>
Update 1 to align with conference submission
</commit_message>
<xml_diff>
--- a/images/src/jetisu diagrams.pptx
+++ b/images/src/jetisu diagrams.pptx
@@ -10,8 +10,9 @@
     <p:sldId id="258" r:id="rId4"/>
     <p:sldId id="259" r:id="rId5"/>
     <p:sldId id="260" r:id="rId6"/>
-    <p:sldId id="261" r:id="rId7"/>
-    <p:sldId id="262" r:id="rId8"/>
+    <p:sldId id="263" r:id="rId7"/>
+    <p:sldId id="261" r:id="rId8"/>
+    <p:sldId id="262" r:id="rId9"/>
   </p:sldIdLst>
   <p:sldSz cx="12192000" cy="6858000"/>
   <p:notesSz cx="7102475" cy="10234613"/>
@@ -20881,7 +20882,7 @@
           <a:p>
             <a:fld id="{EB429232-E4BA-4B3A-9952-EE5A117FBC50}" type="datetimeFigureOut">
               <a:rPr lang="en-AU" smtClean="0"/>
-              <a:t>20/03/2023</a:t>
+              <a:t>10/09/2023</a:t>
             </a:fld>
             <a:endParaRPr lang="en-AU"/>
           </a:p>
@@ -21081,7 +21082,7 @@
           <a:p>
             <a:fld id="{EB429232-E4BA-4B3A-9952-EE5A117FBC50}" type="datetimeFigureOut">
               <a:rPr lang="en-AU" smtClean="0"/>
-              <a:t>20/03/2023</a:t>
+              <a:t>10/09/2023</a:t>
             </a:fld>
             <a:endParaRPr lang="en-AU"/>
           </a:p>
@@ -21291,7 +21292,7 @@
           <a:p>
             <a:fld id="{EB429232-E4BA-4B3A-9952-EE5A117FBC50}" type="datetimeFigureOut">
               <a:rPr lang="en-AU" smtClean="0"/>
-              <a:t>20/03/2023</a:t>
+              <a:t>10/09/2023</a:t>
             </a:fld>
             <a:endParaRPr lang="en-AU"/>
           </a:p>
@@ -21491,7 +21492,7 @@
           <a:p>
             <a:fld id="{EB429232-E4BA-4B3A-9952-EE5A117FBC50}" type="datetimeFigureOut">
               <a:rPr lang="en-AU" smtClean="0"/>
-              <a:t>20/03/2023</a:t>
+              <a:t>10/09/2023</a:t>
             </a:fld>
             <a:endParaRPr lang="en-AU"/>
           </a:p>
@@ -21767,7 +21768,7 @@
           <a:p>
             <a:fld id="{EB429232-E4BA-4B3A-9952-EE5A117FBC50}" type="datetimeFigureOut">
               <a:rPr lang="en-AU" smtClean="0"/>
-              <a:t>20/03/2023</a:t>
+              <a:t>10/09/2023</a:t>
             </a:fld>
             <a:endParaRPr lang="en-AU"/>
           </a:p>
@@ -22035,7 +22036,7 @@
           <a:p>
             <a:fld id="{EB429232-E4BA-4B3A-9952-EE5A117FBC50}" type="datetimeFigureOut">
               <a:rPr lang="en-AU" smtClean="0"/>
-              <a:t>20/03/2023</a:t>
+              <a:t>10/09/2023</a:t>
             </a:fld>
             <a:endParaRPr lang="en-AU"/>
           </a:p>
@@ -22450,7 +22451,7 @@
           <a:p>
             <a:fld id="{EB429232-E4BA-4B3A-9952-EE5A117FBC50}" type="datetimeFigureOut">
               <a:rPr lang="en-AU" smtClean="0"/>
-              <a:t>20/03/2023</a:t>
+              <a:t>10/09/2023</a:t>
             </a:fld>
             <a:endParaRPr lang="en-AU"/>
           </a:p>
@@ -22592,7 +22593,7 @@
           <a:p>
             <a:fld id="{EB429232-E4BA-4B3A-9952-EE5A117FBC50}" type="datetimeFigureOut">
               <a:rPr lang="en-AU" smtClean="0"/>
-              <a:t>20/03/2023</a:t>
+              <a:t>10/09/2023</a:t>
             </a:fld>
             <a:endParaRPr lang="en-AU"/>
           </a:p>
@@ -22705,7 +22706,7 @@
           <a:p>
             <a:fld id="{EB429232-E4BA-4B3A-9952-EE5A117FBC50}" type="datetimeFigureOut">
               <a:rPr lang="en-AU" smtClean="0"/>
-              <a:t>20/03/2023</a:t>
+              <a:t>10/09/2023</a:t>
             </a:fld>
             <a:endParaRPr lang="en-AU"/>
           </a:p>
@@ -23018,7 +23019,7 @@
           <a:p>
             <a:fld id="{EB429232-E4BA-4B3A-9952-EE5A117FBC50}" type="datetimeFigureOut">
               <a:rPr lang="en-AU" smtClean="0"/>
-              <a:t>20/03/2023</a:t>
+              <a:t>10/09/2023</a:t>
             </a:fld>
             <a:endParaRPr lang="en-AU"/>
           </a:p>
@@ -23307,7 +23308,7 @@
           <a:p>
             <a:fld id="{EB429232-E4BA-4B3A-9952-EE5A117FBC50}" type="datetimeFigureOut">
               <a:rPr lang="en-AU" smtClean="0"/>
-              <a:t>20/03/2023</a:t>
+              <a:t>10/09/2023</a:t>
             </a:fld>
             <a:endParaRPr lang="en-AU"/>
           </a:p>
@@ -23550,7 +23551,7 @@
           <a:p>
             <a:fld id="{EB429232-E4BA-4B3A-9952-EE5A117FBC50}" type="datetimeFigureOut">
               <a:rPr lang="en-AU" smtClean="0"/>
-              <a:t>20/03/2023</a:t>
+              <a:t>10/09/2023</a:t>
             </a:fld>
             <a:endParaRPr lang="en-AU"/>
           </a:p>
@@ -26185,6 +26186,1574 @@
 </file>
 
 <file path=ppt/slides/slide6.xml><?xml version="1.0" encoding="utf-8"?>
+<p:sld xmlns:a="http://schemas.openxmlformats.org/drawingml/2006/main" xmlns:r="http://schemas.openxmlformats.org/officeDocument/2006/relationships" xmlns:p="http://schemas.openxmlformats.org/presentationml/2006/main">
+  <p:cSld>
+    <p:spTree>
+      <p:nvGrpSpPr>
+        <p:cNvPr id="1" name=""/>
+        <p:cNvGrpSpPr/>
+        <p:nvPr/>
+      </p:nvGrpSpPr>
+      <p:grpSpPr>
+        <a:xfrm>
+          <a:off x="0" y="0"/>
+          <a:ext cx="0" cy="0"/>
+          <a:chOff x="0" y="0"/>
+          <a:chExt cx="0" cy="0"/>
+        </a:xfrm>
+      </p:grpSpPr>
+      <p:grpSp>
+        <p:nvGrpSpPr>
+          <p:cNvPr id="86" name="Group 85">
+            <a:extLst>
+              <a:ext uri="{FF2B5EF4-FFF2-40B4-BE49-F238E27FC236}">
+                <a16:creationId xmlns:a16="http://schemas.microsoft.com/office/drawing/2014/main" id="{6A0CE737-8A5C-AF78-5F0A-42A4130CF597}"/>
+              </a:ext>
+            </a:extLst>
+          </p:cNvPr>
+          <p:cNvGrpSpPr/>
+          <p:nvPr/>
+        </p:nvGrpSpPr>
+        <p:grpSpPr>
+          <a:xfrm>
+            <a:off x="379396" y="1036355"/>
+            <a:ext cx="4753889" cy="2392645"/>
+            <a:chOff x="817513" y="705446"/>
+            <a:chExt cx="4753889" cy="2392645"/>
+          </a:xfrm>
+        </p:grpSpPr>
+        <p:sp>
+          <p:nvSpPr>
+            <p:cNvPr id="8" name="Rectangle 7">
+              <a:extLst>
+                <a:ext uri="{FF2B5EF4-FFF2-40B4-BE49-F238E27FC236}">
+                  <a16:creationId xmlns:a16="http://schemas.microsoft.com/office/drawing/2014/main" id="{97710AE9-95EA-68DA-50EB-2746CEA2D507}"/>
+                </a:ext>
+              </a:extLst>
+            </p:cNvPr>
+            <p:cNvSpPr/>
+            <p:nvPr/>
+          </p:nvSpPr>
+          <p:spPr>
+            <a:xfrm>
+              <a:off x="1296308" y="1272706"/>
+              <a:ext cx="4275094" cy="1825385"/>
+            </a:xfrm>
+            <a:prstGeom prst="rect">
+              <a:avLst/>
+            </a:prstGeom>
+            <a:solidFill>
+              <a:srgbClr val="4472C4">
+                <a:alpha val="43137"/>
+              </a:srgbClr>
+            </a:solidFill>
+            <a:scene3d>
+              <a:camera prst="isometricOffAxis1Right"/>
+              <a:lightRig rig="threePt" dir="t"/>
+            </a:scene3d>
+            <a:sp3d extrusionH="1803400"/>
+          </p:spPr>
+          <p:style>
+            <a:lnRef idx="2">
+              <a:schemeClr val="accent1">
+                <a:shade val="50000"/>
+              </a:schemeClr>
+            </a:lnRef>
+            <a:fillRef idx="1">
+              <a:schemeClr val="accent1"/>
+            </a:fillRef>
+            <a:effectRef idx="0">
+              <a:schemeClr val="accent1"/>
+            </a:effectRef>
+            <a:fontRef idx="minor">
+              <a:schemeClr val="lt1"/>
+            </a:fontRef>
+          </p:style>
+          <p:txBody>
+            <a:bodyPr rtlCol="0" anchor="ctr"/>
+            <a:lstStyle/>
+            <a:p>
+              <a:pPr algn="ctr"/>
+              <a:endParaRPr lang="en-AU"/>
+            </a:p>
+          </p:txBody>
+        </p:sp>
+        <p:pic>
+          <p:nvPicPr>
+            <p:cNvPr id="9" name="Picture 8">
+              <a:extLst>
+                <a:ext uri="{FF2B5EF4-FFF2-40B4-BE49-F238E27FC236}">
+                  <a16:creationId xmlns:a16="http://schemas.microsoft.com/office/drawing/2014/main" id="{28AC0B48-A6F8-855F-DC61-F9D2AEE29EB7}"/>
+                </a:ext>
+              </a:extLst>
+            </p:cNvPr>
+            <p:cNvPicPr>
+              <a:picLocks noChangeAspect="1"/>
+            </p:cNvPicPr>
+            <p:nvPr/>
+          </p:nvPicPr>
+          <p:blipFill>
+            <a:blip r:embed="rId2"/>
+            <a:stretch>
+              <a:fillRect/>
+            </a:stretch>
+          </p:blipFill>
+          <p:spPr>
+            <a:xfrm>
+              <a:off x="1495705" y="1532518"/>
+              <a:ext cx="2015528" cy="852600"/>
+            </a:xfrm>
+            <a:prstGeom prst="rect">
+              <a:avLst/>
+            </a:prstGeom>
+            <a:scene3d>
+              <a:camera prst="isometricOffAxis1Right"/>
+              <a:lightRig rig="threePt" dir="t"/>
+            </a:scene3d>
+          </p:spPr>
+        </p:pic>
+        <p:sp>
+          <p:nvSpPr>
+            <p:cNvPr id="31" name="TextBox 30">
+              <a:extLst>
+                <a:ext uri="{FF2B5EF4-FFF2-40B4-BE49-F238E27FC236}">
+                  <a16:creationId xmlns:a16="http://schemas.microsoft.com/office/drawing/2014/main" id="{7EDE61CC-55B2-636A-3C6D-B98EA8B560B2}"/>
+                </a:ext>
+              </a:extLst>
+            </p:cNvPr>
+            <p:cNvSpPr txBox="1"/>
+            <p:nvPr/>
+          </p:nvSpPr>
+          <p:spPr>
+            <a:xfrm>
+              <a:off x="2917430" y="2365405"/>
+              <a:ext cx="1383391" cy="584775"/>
+            </a:xfrm>
+            <a:prstGeom prst="rect">
+              <a:avLst/>
+            </a:prstGeom>
+            <a:solidFill>
+              <a:srgbClr val="7F7F7F">
+                <a:alpha val="38039"/>
+              </a:srgbClr>
+            </a:solidFill>
+            <a:scene3d>
+              <a:camera prst="isometricOffAxis1Right"/>
+              <a:lightRig rig="threePt" dir="t"/>
+            </a:scene3d>
+          </p:spPr>
+          <p:txBody>
+            <a:bodyPr wrap="none" rtlCol="0">
+              <a:spAutoFit/>
+            </a:bodyPr>
+            <a:lstStyle/>
+            <a:p>
+              <a:pPr algn="ctr"/>
+              <a:r>
+                <a:rPr lang="en-AU" sz="1600" dirty="0"/>
+                <a:t>Data Relations</a:t>
+              </a:r>
+              <a:br>
+                <a:rPr lang="en-AU" sz="1600" dirty="0"/>
+              </a:br>
+              <a:r>
+                <a:rPr lang="en-AU" sz="1600" dirty="0"/>
+                <a:t>(Data)</a:t>
+              </a:r>
+            </a:p>
+          </p:txBody>
+        </p:sp>
+        <p:pic>
+          <p:nvPicPr>
+            <p:cNvPr id="34" name="Picture 33">
+              <a:extLst>
+                <a:ext uri="{FF2B5EF4-FFF2-40B4-BE49-F238E27FC236}">
+                  <a16:creationId xmlns:a16="http://schemas.microsoft.com/office/drawing/2014/main" id="{A9F6BBF9-C148-0DC1-4FE9-AB515004A7E5}"/>
+                </a:ext>
+              </a:extLst>
+            </p:cNvPr>
+            <p:cNvPicPr>
+              <a:picLocks noChangeAspect="1"/>
+            </p:cNvPicPr>
+            <p:nvPr/>
+          </p:nvPicPr>
+          <p:blipFill>
+            <a:blip r:embed="rId2"/>
+            <a:stretch>
+              <a:fillRect/>
+            </a:stretch>
+          </p:blipFill>
+          <p:spPr>
+            <a:xfrm>
+              <a:off x="3439489" y="1269855"/>
+              <a:ext cx="1031690" cy="436421"/>
+            </a:xfrm>
+            <a:prstGeom prst="rect">
+              <a:avLst/>
+            </a:prstGeom>
+            <a:scene3d>
+              <a:camera prst="isometricOffAxis1Right"/>
+              <a:lightRig rig="threePt" dir="t"/>
+            </a:scene3d>
+          </p:spPr>
+        </p:pic>
+        <p:pic>
+          <p:nvPicPr>
+            <p:cNvPr id="35" name="Picture 34">
+              <a:extLst>
+                <a:ext uri="{FF2B5EF4-FFF2-40B4-BE49-F238E27FC236}">
+                  <a16:creationId xmlns:a16="http://schemas.microsoft.com/office/drawing/2014/main" id="{10AE2780-87D0-C164-4973-CCAFD20FFC10}"/>
+                </a:ext>
+              </a:extLst>
+            </p:cNvPr>
+            <p:cNvPicPr>
+              <a:picLocks noChangeAspect="1"/>
+            </p:cNvPicPr>
+            <p:nvPr/>
+          </p:nvPicPr>
+          <p:blipFill>
+            <a:blip r:embed="rId2"/>
+            <a:stretch>
+              <a:fillRect/>
+            </a:stretch>
+          </p:blipFill>
+          <p:spPr>
+            <a:xfrm>
+              <a:off x="3440966" y="1786407"/>
+              <a:ext cx="1031690" cy="436421"/>
+            </a:xfrm>
+            <a:prstGeom prst="rect">
+              <a:avLst/>
+            </a:prstGeom>
+            <a:scene3d>
+              <a:camera prst="isometricOffAxis1Right"/>
+              <a:lightRig rig="threePt" dir="t"/>
+            </a:scene3d>
+          </p:spPr>
+        </p:pic>
+        <p:sp>
+          <p:nvSpPr>
+            <p:cNvPr id="56" name="TextBox 55">
+              <a:extLst>
+                <a:ext uri="{FF2B5EF4-FFF2-40B4-BE49-F238E27FC236}">
+                  <a16:creationId xmlns:a16="http://schemas.microsoft.com/office/drawing/2014/main" id="{1ED22BD1-0616-732B-4C9D-19EE8D8C7C4F}"/>
+                </a:ext>
+              </a:extLst>
+            </p:cNvPr>
+            <p:cNvSpPr txBox="1"/>
+            <p:nvPr/>
+          </p:nvSpPr>
+          <p:spPr>
+            <a:xfrm>
+              <a:off x="1004766" y="705446"/>
+              <a:ext cx="4266527" cy="646331"/>
+            </a:xfrm>
+            <a:prstGeom prst="rect">
+              <a:avLst/>
+            </a:prstGeom>
+            <a:noFill/>
+            <a:scene3d>
+              <a:camera prst="isometricOffAxis1Right"/>
+              <a:lightRig rig="threePt" dir="t"/>
+            </a:scene3d>
+          </p:spPr>
+          <p:txBody>
+            <a:bodyPr wrap="square">
+              <a:spAutoFit/>
+            </a:bodyPr>
+            <a:lstStyle/>
+            <a:p>
+              <a:pPr lvl="0"/>
+              <a:r>
+                <a:rPr lang="en-AU" sz="1200" dirty="0">
+                  <a:solidFill>
+                    <a:schemeClr val="bg1"/>
+                  </a:solidFill>
+                </a:rPr>
+                <a:t>Hardware, scale, cloud, multi-vendors, indexing, storage,</a:t>
+              </a:r>
+              <a:br>
+                <a:rPr lang="en-AU" sz="1200" dirty="0">
+                  <a:solidFill>
+                    <a:schemeClr val="bg1"/>
+                  </a:solidFill>
+                </a:rPr>
+              </a:br>
+              <a:r>
+                <a:rPr lang="en-AU" sz="1200" dirty="0">
+                  <a:solidFill>
+                    <a:schemeClr val="bg1"/>
+                  </a:solidFill>
+                </a:rPr>
+                <a:t>     replication, transactions, concurrency, recovery, distributed</a:t>
+              </a:r>
+              <a:br>
+                <a:rPr lang="en-AU" sz="1200" dirty="0">
+                  <a:solidFill>
+                    <a:schemeClr val="bg1"/>
+                  </a:solidFill>
+                </a:rPr>
+              </a:br>
+              <a:r>
+                <a:rPr lang="en-AU" sz="1200" dirty="0">
+                  <a:solidFill>
+                    <a:schemeClr val="bg1"/>
+                  </a:solidFill>
+                </a:rPr>
+                <a:t>         systems, materialisation, backup, …</a:t>
+              </a:r>
+            </a:p>
+          </p:txBody>
+        </p:sp>
+        <p:pic>
+          <p:nvPicPr>
+            <p:cNvPr id="17" name="Graphic 16" descr="Database outline">
+              <a:extLst>
+                <a:ext uri="{FF2B5EF4-FFF2-40B4-BE49-F238E27FC236}">
+                  <a16:creationId xmlns:a16="http://schemas.microsoft.com/office/drawing/2014/main" id="{6D3DD6EB-BE40-8023-CA65-BBC1F77674DA}"/>
+                </a:ext>
+              </a:extLst>
+            </p:cNvPr>
+            <p:cNvPicPr>
+              <a:picLocks noChangeAspect="1"/>
+            </p:cNvPicPr>
+            <p:nvPr/>
+          </p:nvPicPr>
+          <p:blipFill>
+            <a:blip r:embed="rId3">
+              <a:extLst>
+                <a:ext uri="{28A0092B-C50C-407E-A947-70E740481C1C}">
+                  <a14:useLocalDpi xmlns:a14="http://schemas.microsoft.com/office/drawing/2010/main" val="0"/>
+                </a:ext>
+                <a:ext uri="{96DAC541-7B7A-43D3-8B79-37D633B846F1}">
+                  <asvg:svgBlip xmlns:asvg="http://schemas.microsoft.com/office/drawing/2016/SVG/main" r:embed="rId4"/>
+                </a:ext>
+              </a:extLst>
+            </a:blip>
+            <a:stretch>
+              <a:fillRect/>
+            </a:stretch>
+          </p:blipFill>
+          <p:spPr>
+            <a:xfrm>
+              <a:off x="817513" y="1547157"/>
+              <a:ext cx="450845" cy="450845"/>
+            </a:xfrm>
+            <a:prstGeom prst="rect">
+              <a:avLst/>
+            </a:prstGeom>
+          </p:spPr>
+        </p:pic>
+        <p:pic>
+          <p:nvPicPr>
+            <p:cNvPr id="18" name="Graphic 17" descr="Database outline">
+              <a:extLst>
+                <a:ext uri="{FF2B5EF4-FFF2-40B4-BE49-F238E27FC236}">
+                  <a16:creationId xmlns:a16="http://schemas.microsoft.com/office/drawing/2014/main" id="{9CDD86AC-F46E-192E-724A-73FCBFD27404}"/>
+                </a:ext>
+              </a:extLst>
+            </p:cNvPr>
+            <p:cNvPicPr>
+              <a:picLocks noChangeAspect="1"/>
+            </p:cNvPicPr>
+            <p:nvPr/>
+          </p:nvPicPr>
+          <p:blipFill>
+            <a:blip r:embed="rId3">
+              <a:extLst>
+                <a:ext uri="{28A0092B-C50C-407E-A947-70E740481C1C}">
+                  <a14:useLocalDpi xmlns:a14="http://schemas.microsoft.com/office/drawing/2010/main" val="0"/>
+                </a:ext>
+                <a:ext uri="{96DAC541-7B7A-43D3-8B79-37D633B846F1}">
+                  <asvg:svgBlip xmlns:asvg="http://schemas.microsoft.com/office/drawing/2016/SVG/main" r:embed="rId4"/>
+                </a:ext>
+              </a:extLst>
+            </a:blip>
+            <a:stretch>
+              <a:fillRect/>
+            </a:stretch>
+          </p:blipFill>
+          <p:spPr>
+            <a:xfrm>
+              <a:off x="828679" y="2159695"/>
+              <a:ext cx="450845" cy="450845"/>
+            </a:xfrm>
+            <a:prstGeom prst="rect">
+              <a:avLst/>
+            </a:prstGeom>
+          </p:spPr>
+        </p:pic>
+      </p:grpSp>
+      <p:grpSp>
+        <p:nvGrpSpPr>
+          <p:cNvPr id="7" name="Group 6">
+            <a:extLst>
+              <a:ext uri="{FF2B5EF4-FFF2-40B4-BE49-F238E27FC236}">
+                <a16:creationId xmlns:a16="http://schemas.microsoft.com/office/drawing/2014/main" id="{69DFD1F3-4882-8433-8638-0361F3D28D0C}"/>
+              </a:ext>
+            </a:extLst>
+          </p:cNvPr>
+          <p:cNvGrpSpPr/>
+          <p:nvPr/>
+        </p:nvGrpSpPr>
+        <p:grpSpPr>
+          <a:xfrm>
+            <a:off x="5252226" y="382372"/>
+            <a:ext cx="4875275" cy="2764204"/>
+            <a:chOff x="5252226" y="382372"/>
+            <a:chExt cx="4875275" cy="2764204"/>
+          </a:xfrm>
+        </p:grpSpPr>
+        <p:grpSp>
+          <p:nvGrpSpPr>
+            <p:cNvPr id="87" name="Group 86">
+              <a:extLst>
+                <a:ext uri="{FF2B5EF4-FFF2-40B4-BE49-F238E27FC236}">
+                  <a16:creationId xmlns:a16="http://schemas.microsoft.com/office/drawing/2014/main" id="{CAE53593-E0B9-139C-70BE-C8AFFA32AD83}"/>
+                </a:ext>
+              </a:extLst>
+            </p:cNvPr>
+            <p:cNvGrpSpPr/>
+            <p:nvPr/>
+          </p:nvGrpSpPr>
+          <p:grpSpPr>
+            <a:xfrm>
+              <a:off x="5453223" y="382372"/>
+              <a:ext cx="4674278" cy="2285089"/>
+              <a:chOff x="6412822" y="653382"/>
+              <a:chExt cx="4674278" cy="2285089"/>
+            </a:xfrm>
+          </p:grpSpPr>
+          <p:sp>
+            <p:nvSpPr>
+              <p:cNvPr id="14" name="Rectangle 13">
+                <a:extLst>
+                  <a:ext uri="{FF2B5EF4-FFF2-40B4-BE49-F238E27FC236}">
+                    <a16:creationId xmlns:a16="http://schemas.microsoft.com/office/drawing/2014/main" id="{2B4080B8-42F3-4F8D-FBB2-8CB777385CE7}"/>
+                  </a:ext>
+                </a:extLst>
+              </p:cNvPr>
+              <p:cNvSpPr/>
+              <p:nvPr/>
+            </p:nvSpPr>
+            <p:spPr>
+              <a:xfrm>
+                <a:off x="6812006" y="1113086"/>
+                <a:ext cx="4275094" cy="1825385"/>
+              </a:xfrm>
+              <a:prstGeom prst="rect">
+                <a:avLst/>
+              </a:prstGeom>
+              <a:solidFill>
+                <a:srgbClr val="D8C4E8"/>
+              </a:solidFill>
+              <a:scene3d>
+                <a:camera prst="isometricOffAxis1Right"/>
+                <a:lightRig rig="threePt" dir="t"/>
+              </a:scene3d>
+              <a:sp3d extrusionH="1803400">
+                <a:extrusionClr>
+                  <a:srgbClr val="7030A0"/>
+                </a:extrusionClr>
+              </a:sp3d>
+            </p:spPr>
+            <p:style>
+              <a:lnRef idx="2">
+                <a:schemeClr val="accent1">
+                  <a:shade val="50000"/>
+                </a:schemeClr>
+              </a:lnRef>
+              <a:fillRef idx="1">
+                <a:schemeClr val="accent1"/>
+              </a:fillRef>
+              <a:effectRef idx="0">
+                <a:schemeClr val="accent1"/>
+              </a:effectRef>
+              <a:fontRef idx="minor">
+                <a:schemeClr val="lt1"/>
+              </a:fontRef>
+            </p:style>
+            <p:txBody>
+              <a:bodyPr rtlCol="0" anchor="ctr"/>
+              <a:lstStyle/>
+              <a:p>
+                <a:pPr algn="ctr"/>
+                <a:endParaRPr lang="en-AU"/>
+              </a:p>
+            </p:txBody>
+          </p:sp>
+          <p:pic>
+            <p:nvPicPr>
+              <p:cNvPr id="15" name="Picture 14">
+                <a:extLst>
+                  <a:ext uri="{FF2B5EF4-FFF2-40B4-BE49-F238E27FC236}">
+                    <a16:creationId xmlns:a16="http://schemas.microsoft.com/office/drawing/2014/main" id="{F466AE72-54D8-447C-43C4-C50DB237B69C}"/>
+                  </a:ext>
+                </a:extLst>
+              </p:cNvPr>
+              <p:cNvPicPr>
+                <a:picLocks noChangeAspect="1"/>
+              </p:cNvPicPr>
+              <p:nvPr/>
+            </p:nvPicPr>
+            <p:blipFill>
+              <a:blip r:embed="rId2"/>
+              <a:stretch>
+                <a:fillRect/>
+              </a:stretch>
+            </p:blipFill>
+            <p:spPr>
+              <a:xfrm>
+                <a:off x="8352450" y="1131684"/>
+                <a:ext cx="2015528" cy="852600"/>
+              </a:xfrm>
+              <a:prstGeom prst="rect">
+                <a:avLst/>
+              </a:prstGeom>
+              <a:solidFill>
+                <a:srgbClr val="7030A0">
+                  <a:alpha val="30980"/>
+                </a:srgbClr>
+              </a:solidFill>
+              <a:scene3d>
+                <a:camera prst="isometricOffAxis1Right"/>
+                <a:lightRig rig="threePt" dir="t"/>
+              </a:scene3d>
+            </p:spPr>
+          </p:pic>
+          <p:sp>
+            <p:nvSpPr>
+              <p:cNvPr id="32" name="TextBox 31">
+                <a:extLst>
+                  <a:ext uri="{FF2B5EF4-FFF2-40B4-BE49-F238E27FC236}">
+                    <a16:creationId xmlns:a16="http://schemas.microsoft.com/office/drawing/2014/main" id="{D5F7E915-F4BF-CADF-ECD7-9DA2EED5F1B5}"/>
+                  </a:ext>
+                </a:extLst>
+              </p:cNvPr>
+              <p:cNvSpPr txBox="1"/>
+              <p:nvPr/>
+            </p:nvSpPr>
+            <p:spPr>
+              <a:xfrm>
+                <a:off x="7441274" y="2222271"/>
+                <a:ext cx="3073663" cy="584775"/>
+              </a:xfrm>
+              <a:prstGeom prst="rect">
+                <a:avLst/>
+              </a:prstGeom>
+              <a:solidFill>
+                <a:srgbClr val="7F7F7F">
+                  <a:alpha val="38039"/>
+                </a:srgbClr>
+              </a:solidFill>
+              <a:scene3d>
+                <a:camera prst="isometricOffAxis1Right"/>
+                <a:lightRig rig="threePt" dir="t"/>
+              </a:scene3d>
+            </p:spPr>
+            <p:txBody>
+              <a:bodyPr wrap="none" rtlCol="0">
+                <a:spAutoFit/>
+              </a:bodyPr>
+              <a:lstStyle/>
+              <a:p>
+                <a:pPr algn="ctr"/>
+                <a:r>
+                  <a:rPr lang="en-AU" sz="1600" dirty="0"/>
+                  <a:t>Sigma Complete Relations</a:t>
+                </a:r>
+                <a:br>
+                  <a:rPr lang="en-AU" sz="1600" dirty="0"/>
+                </a:br>
+                <a:r>
+                  <a:rPr lang="en-AU" sz="1600" dirty="0"/>
+                  <a:t>(Computations and Business Logic)</a:t>
+                </a:r>
+              </a:p>
+            </p:txBody>
+          </p:sp>
+          <p:pic>
+            <p:nvPicPr>
+              <p:cNvPr id="41" name="Picture 40">
+                <a:extLst>
+                  <a:ext uri="{FF2B5EF4-FFF2-40B4-BE49-F238E27FC236}">
+                    <a16:creationId xmlns:a16="http://schemas.microsoft.com/office/drawing/2014/main" id="{FB707429-710A-D467-C4EB-D3B65485D3A1}"/>
+                  </a:ext>
+                </a:extLst>
+              </p:cNvPr>
+              <p:cNvPicPr>
+                <a:picLocks noChangeAspect="1"/>
+              </p:cNvPicPr>
+              <p:nvPr/>
+            </p:nvPicPr>
+            <p:blipFill>
+              <a:blip r:embed="rId2"/>
+              <a:stretch>
+                <a:fillRect/>
+              </a:stretch>
+            </p:blipFill>
+            <p:spPr>
+              <a:xfrm>
+                <a:off x="7083611" y="1454069"/>
+                <a:ext cx="1031690" cy="436421"/>
+              </a:xfrm>
+              <a:prstGeom prst="rect">
+                <a:avLst/>
+              </a:prstGeom>
+              <a:scene3d>
+                <a:camera prst="isometricOffAxis1Right"/>
+                <a:lightRig rig="threePt" dir="t"/>
+              </a:scene3d>
+            </p:spPr>
+          </p:pic>
+          <p:sp>
+            <p:nvSpPr>
+              <p:cNvPr id="50" name="TextBox 49">
+                <a:extLst>
+                  <a:ext uri="{FF2B5EF4-FFF2-40B4-BE49-F238E27FC236}">
+                    <a16:creationId xmlns:a16="http://schemas.microsoft.com/office/drawing/2014/main" id="{BCAFEC12-1DA4-76B6-0B88-08E038EEFD7B}"/>
+                  </a:ext>
+                </a:extLst>
+              </p:cNvPr>
+              <p:cNvSpPr txBox="1"/>
+              <p:nvPr/>
+            </p:nvSpPr>
+            <p:spPr>
+              <a:xfrm>
+                <a:off x="6412822" y="653382"/>
+                <a:ext cx="4227155" cy="461665"/>
+              </a:xfrm>
+              <a:prstGeom prst="rect">
+                <a:avLst/>
+              </a:prstGeom>
+              <a:noFill/>
+              <a:scene3d>
+                <a:camera prst="isometricOffAxis1Right"/>
+                <a:lightRig rig="threePt" dir="t"/>
+              </a:scene3d>
+            </p:spPr>
+            <p:txBody>
+              <a:bodyPr wrap="square">
+                <a:spAutoFit/>
+              </a:bodyPr>
+              <a:lstStyle/>
+              <a:p>
+                <a:pPr lvl="0" algn="ctr"/>
+                <a:r>
+                  <a:rPr lang="en-AU" sz="1200" dirty="0">
+                    <a:solidFill>
+                      <a:schemeClr val="bg1"/>
+                    </a:solidFill>
+                  </a:rPr>
+                  <a:t>Logic, Search, SMT Solvers, Numerical Methods,</a:t>
+                </a:r>
+                <a:br>
+                  <a:rPr lang="en-AU" sz="1200" dirty="0">
+                    <a:solidFill>
+                      <a:schemeClr val="bg1"/>
+                    </a:solidFill>
+                  </a:rPr>
+                </a:br>
+                <a:r>
+                  <a:rPr lang="en-AU" sz="1200" dirty="0">
+                    <a:solidFill>
+                      <a:schemeClr val="bg1"/>
+                    </a:solidFill>
+                  </a:rPr>
+                  <a:t>     Constraint Programming, Symbolic Computation, Type Theory</a:t>
+                </a:r>
+              </a:p>
+            </p:txBody>
+          </p:sp>
+        </p:grpSp>
+        <p:sp>
+          <p:nvSpPr>
+            <p:cNvPr id="3" name="TextBox 2">
+              <a:extLst>
+                <a:ext uri="{FF2B5EF4-FFF2-40B4-BE49-F238E27FC236}">
+                  <a16:creationId xmlns:a16="http://schemas.microsoft.com/office/drawing/2014/main" id="{72B9F781-70FD-6179-47B5-0707884D9D1A}"/>
+                </a:ext>
+              </a:extLst>
+            </p:cNvPr>
+            <p:cNvSpPr txBox="1"/>
+            <p:nvPr/>
+          </p:nvSpPr>
+          <p:spPr>
+            <a:xfrm>
+              <a:off x="5252226" y="838252"/>
+              <a:ext cx="1017916" cy="2308324"/>
+            </a:xfrm>
+            <a:prstGeom prst="rect">
+              <a:avLst/>
+            </a:prstGeom>
+            <a:noFill/>
+            <a:scene3d>
+              <a:camera prst="isometricLeftDown"/>
+              <a:lightRig rig="threePt" dir="t"/>
+            </a:scene3d>
+          </p:spPr>
+          <p:txBody>
+            <a:bodyPr wrap="square" rtlCol="0">
+              <a:spAutoFit/>
+            </a:bodyPr>
+            <a:lstStyle/>
+            <a:p>
+              <a:r>
+                <a:rPr lang="en-AU" sz="2400" b="1" kern="0" dirty="0">
+                  <a:solidFill>
+                    <a:schemeClr val="accent1">
+                      <a:lumMod val="60000"/>
+                      <a:lumOff val="40000"/>
+                    </a:schemeClr>
+                  </a:solidFill>
+                  <a:effectLst/>
+                  <a:latin typeface="Cambria Math" panose="02040503050406030204" pitchFamily="18" charset="0"/>
+                  <a:ea typeface="Times New Roman" panose="02020603050405020304" pitchFamily="18" charset="0"/>
+                  <a:cs typeface="Cambria Math" panose="02040503050406030204" pitchFamily="18" charset="0"/>
+                </a:rPr>
+                <a:t>⇒</a:t>
+              </a:r>
+              <a:r>
+                <a:rPr lang="en-AU" sz="2400" b="1" kern="0" dirty="0">
+                  <a:solidFill>
+                    <a:schemeClr val="accent1">
+                      <a:lumMod val="60000"/>
+                      <a:lumOff val="40000"/>
+                    </a:schemeClr>
+                  </a:solidFill>
+                  <a:effectLst/>
+                  <a:latin typeface="Arial" panose="020B0604020202020204" pitchFamily="34" charset="0"/>
+                  <a:ea typeface="Times New Roman" panose="02020603050405020304" pitchFamily="18" charset="0"/>
+                  <a:cs typeface="Times New Roman" panose="02020603050405020304" pitchFamily="18" charset="0"/>
+                </a:rPr>
+                <a:t> </a:t>
+              </a:r>
+              <a:r>
+                <a:rPr lang="en-AU" sz="2400" b="1" kern="0" dirty="0">
+                  <a:solidFill>
+                    <a:schemeClr val="accent1">
+                      <a:lumMod val="60000"/>
+                      <a:lumOff val="40000"/>
+                    </a:schemeClr>
+                  </a:solidFill>
+                  <a:effectLst/>
+                  <a:latin typeface="Cambria Math" panose="02040503050406030204" pitchFamily="18" charset="0"/>
+                  <a:ea typeface="Times New Roman" panose="02020603050405020304" pitchFamily="18" charset="0"/>
+                  <a:cs typeface="Cambria Math" panose="02040503050406030204" pitchFamily="18" charset="0"/>
+                </a:rPr>
+                <a:t>⇔</a:t>
+              </a:r>
+              <a:r>
+                <a:rPr lang="en-AU" sz="2400" b="1" kern="0" dirty="0">
+                  <a:solidFill>
+                    <a:schemeClr val="accent1">
+                      <a:lumMod val="60000"/>
+                      <a:lumOff val="40000"/>
+                    </a:schemeClr>
+                  </a:solidFill>
+                  <a:effectLst/>
+                  <a:latin typeface="Arial" panose="020B0604020202020204" pitchFamily="34" charset="0"/>
+                  <a:ea typeface="Times New Roman" panose="02020603050405020304" pitchFamily="18" charset="0"/>
+                  <a:cs typeface="Times New Roman" panose="02020603050405020304" pitchFamily="18" charset="0"/>
+                </a:rPr>
+                <a:t> ¬ </a:t>
+              </a:r>
+              <a:r>
+                <a:rPr lang="en-AU" sz="2400" b="1" kern="0" dirty="0">
+                  <a:solidFill>
+                    <a:schemeClr val="accent1">
+                      <a:lumMod val="60000"/>
+                      <a:lumOff val="40000"/>
+                    </a:schemeClr>
+                  </a:solidFill>
+                  <a:effectLst/>
+                  <a:latin typeface="Cambria Math" panose="02040503050406030204" pitchFamily="18" charset="0"/>
+                  <a:ea typeface="Times New Roman" panose="02020603050405020304" pitchFamily="18" charset="0"/>
+                  <a:cs typeface="Cambria Math" panose="02040503050406030204" pitchFamily="18" charset="0"/>
+                </a:rPr>
+                <a:t>∧</a:t>
+              </a:r>
+              <a:r>
+                <a:rPr lang="en-AU" sz="2400" b="1" kern="0" dirty="0">
+                  <a:solidFill>
+                    <a:schemeClr val="accent1">
+                      <a:lumMod val="60000"/>
+                      <a:lumOff val="40000"/>
+                    </a:schemeClr>
+                  </a:solidFill>
+                  <a:effectLst/>
+                  <a:latin typeface="Arial" panose="020B0604020202020204" pitchFamily="34" charset="0"/>
+                  <a:ea typeface="Times New Roman" panose="02020603050405020304" pitchFamily="18" charset="0"/>
+                  <a:cs typeface="Times New Roman" panose="02020603050405020304" pitchFamily="18" charset="0"/>
+                </a:rPr>
+                <a:t> </a:t>
+              </a:r>
+              <a:r>
+                <a:rPr lang="en-AU" sz="2400" b="1" kern="0" dirty="0">
+                  <a:solidFill>
+                    <a:schemeClr val="accent1">
+                      <a:lumMod val="60000"/>
+                      <a:lumOff val="40000"/>
+                    </a:schemeClr>
+                  </a:solidFill>
+                  <a:effectLst/>
+                  <a:latin typeface="Cambria Math" panose="02040503050406030204" pitchFamily="18" charset="0"/>
+                  <a:ea typeface="Times New Roman" panose="02020603050405020304" pitchFamily="18" charset="0"/>
+                  <a:cs typeface="Cambria Math" panose="02040503050406030204" pitchFamily="18" charset="0"/>
+                </a:rPr>
+                <a:t>∨</a:t>
+              </a:r>
+              <a:r>
+                <a:rPr lang="en-AU" sz="2400" b="1" kern="0" dirty="0">
+                  <a:solidFill>
+                    <a:schemeClr val="accent1">
+                      <a:lumMod val="60000"/>
+                      <a:lumOff val="40000"/>
+                    </a:schemeClr>
+                  </a:solidFill>
+                  <a:effectLst/>
+                  <a:latin typeface="Arial" panose="020B0604020202020204" pitchFamily="34" charset="0"/>
+                  <a:ea typeface="Times New Roman" panose="02020603050405020304" pitchFamily="18" charset="0"/>
+                  <a:cs typeface="Times New Roman" panose="02020603050405020304" pitchFamily="18" charset="0"/>
+                </a:rPr>
+                <a:t> </a:t>
+              </a:r>
+              <a:r>
+                <a:rPr lang="en-AU" sz="2400" b="1" kern="0" dirty="0">
+                  <a:solidFill>
+                    <a:schemeClr val="accent1">
+                      <a:lumMod val="60000"/>
+                      <a:lumOff val="40000"/>
+                    </a:schemeClr>
+                  </a:solidFill>
+                  <a:effectLst/>
+                  <a:latin typeface="Cambria Math" panose="02040503050406030204" pitchFamily="18" charset="0"/>
+                  <a:ea typeface="Times New Roman" panose="02020603050405020304" pitchFamily="18" charset="0"/>
+                  <a:cs typeface="Cambria Math" panose="02040503050406030204" pitchFamily="18" charset="0"/>
+                </a:rPr>
+                <a:t>∀</a:t>
+              </a:r>
+              <a:r>
+                <a:rPr lang="en-AU" sz="2400" b="1" kern="0" dirty="0">
+                  <a:solidFill>
+                    <a:schemeClr val="accent1">
+                      <a:lumMod val="60000"/>
+                      <a:lumOff val="40000"/>
+                    </a:schemeClr>
+                  </a:solidFill>
+                  <a:effectLst/>
+                  <a:latin typeface="Arial" panose="020B0604020202020204" pitchFamily="34" charset="0"/>
+                  <a:ea typeface="Times New Roman" panose="02020603050405020304" pitchFamily="18" charset="0"/>
+                  <a:cs typeface="Times New Roman" panose="02020603050405020304" pitchFamily="18" charset="0"/>
+                </a:rPr>
+                <a:t> </a:t>
+              </a:r>
+              <a:r>
+                <a:rPr lang="en-AU" sz="2400" b="1" kern="0" dirty="0">
+                  <a:solidFill>
+                    <a:schemeClr val="accent1">
+                      <a:lumMod val="60000"/>
+                      <a:lumOff val="40000"/>
+                    </a:schemeClr>
+                  </a:solidFill>
+                  <a:effectLst/>
+                  <a:latin typeface="Cambria Math" panose="02040503050406030204" pitchFamily="18" charset="0"/>
+                  <a:ea typeface="Times New Roman" panose="02020603050405020304" pitchFamily="18" charset="0"/>
+                  <a:cs typeface="Cambria Math" panose="02040503050406030204" pitchFamily="18" charset="0"/>
+                </a:rPr>
+                <a:t>∃</a:t>
+              </a:r>
+              <a:r>
+                <a:rPr lang="en-AU" sz="2400" b="1" kern="0" dirty="0">
+                  <a:solidFill>
+                    <a:schemeClr val="accent1">
+                      <a:lumMod val="60000"/>
+                      <a:lumOff val="40000"/>
+                    </a:schemeClr>
+                  </a:solidFill>
+                  <a:effectLst/>
+                  <a:latin typeface="Arial" panose="020B0604020202020204" pitchFamily="34" charset="0"/>
+                  <a:ea typeface="Times New Roman" panose="02020603050405020304" pitchFamily="18" charset="0"/>
+                  <a:cs typeface="Times New Roman" panose="02020603050405020304" pitchFamily="18" charset="0"/>
+                </a:rPr>
+                <a:t> ! </a:t>
+              </a:r>
+              <a:r>
+                <a:rPr lang="en-AU" sz="2400" b="1" kern="0" dirty="0">
+                  <a:solidFill>
+                    <a:schemeClr val="accent1">
+                      <a:lumMod val="60000"/>
+                      <a:lumOff val="40000"/>
+                    </a:schemeClr>
+                  </a:solidFill>
+                  <a:effectLst/>
+                  <a:latin typeface="Cambria Math" panose="02040503050406030204" pitchFamily="18" charset="0"/>
+                  <a:ea typeface="Times New Roman" panose="02020603050405020304" pitchFamily="18" charset="0"/>
+                  <a:cs typeface="Cambria Math" panose="02040503050406030204" pitchFamily="18" charset="0"/>
+                </a:rPr>
+                <a:t>≔</a:t>
+              </a:r>
+              <a:r>
+                <a:rPr lang="en-AU" sz="2400" b="1" kern="0" dirty="0">
+                  <a:solidFill>
+                    <a:schemeClr val="accent1">
+                      <a:lumMod val="60000"/>
+                      <a:lumOff val="40000"/>
+                    </a:schemeClr>
+                  </a:solidFill>
+                  <a:effectLst/>
+                  <a:latin typeface="Arial" panose="020B0604020202020204" pitchFamily="34" charset="0"/>
+                  <a:ea typeface="Times New Roman" panose="02020603050405020304" pitchFamily="18" charset="0"/>
+                  <a:cs typeface="Times New Roman" panose="02020603050405020304" pitchFamily="18" charset="0"/>
+                </a:rPr>
+                <a:t> </a:t>
+              </a:r>
+              <a:r>
+                <a:rPr lang="en-AU" sz="2400" b="1" kern="0" dirty="0">
+                  <a:solidFill>
+                    <a:schemeClr val="accent1">
+                      <a:lumMod val="60000"/>
+                      <a:lumOff val="40000"/>
+                    </a:schemeClr>
+                  </a:solidFill>
+                  <a:effectLst/>
+                  <a:latin typeface="Cambria Math" panose="02040503050406030204" pitchFamily="18" charset="0"/>
+                  <a:ea typeface="Times New Roman" panose="02020603050405020304" pitchFamily="18" charset="0"/>
+                  <a:cs typeface="Cambria Math" panose="02040503050406030204" pitchFamily="18" charset="0"/>
+                </a:rPr>
+                <a:t>⊢</a:t>
+              </a:r>
+              <a:r>
+                <a:rPr lang="en-AU" sz="2400" b="1" kern="0" dirty="0">
+                  <a:solidFill>
+                    <a:schemeClr val="accent1">
+                      <a:lumMod val="60000"/>
+                      <a:lumOff val="40000"/>
+                    </a:schemeClr>
+                  </a:solidFill>
+                  <a:effectLst/>
+                  <a:latin typeface="Arial" panose="020B0604020202020204" pitchFamily="34" charset="0"/>
+                  <a:ea typeface="Times New Roman" panose="02020603050405020304" pitchFamily="18" charset="0"/>
+                  <a:cs typeface="Times New Roman" panose="02020603050405020304" pitchFamily="18" charset="0"/>
+                </a:rPr>
+                <a:t> </a:t>
+              </a:r>
+              <a:r>
+                <a:rPr lang="en-AU" sz="2400" b="1" kern="0" dirty="0">
+                  <a:solidFill>
+                    <a:schemeClr val="accent1">
+                      <a:lumMod val="60000"/>
+                      <a:lumOff val="40000"/>
+                    </a:schemeClr>
+                  </a:solidFill>
+                  <a:effectLst/>
+                  <a:latin typeface="Cambria Math" panose="02040503050406030204" pitchFamily="18" charset="0"/>
+                  <a:ea typeface="Times New Roman" panose="02020603050405020304" pitchFamily="18" charset="0"/>
+                  <a:cs typeface="Cambria Math" panose="02040503050406030204" pitchFamily="18" charset="0"/>
+                </a:rPr>
+                <a:t>⊨</a:t>
+              </a:r>
+              <a:r>
+                <a:rPr lang="en-AU" sz="2400" b="1" kern="0" dirty="0">
+                  <a:solidFill>
+                    <a:schemeClr val="accent1">
+                      <a:lumMod val="60000"/>
+                      <a:lumOff val="40000"/>
+                    </a:schemeClr>
+                  </a:solidFill>
+                  <a:effectLst/>
+                  <a:latin typeface="Arial" panose="020B0604020202020204" pitchFamily="34" charset="0"/>
+                  <a:ea typeface="Times New Roman" panose="02020603050405020304" pitchFamily="18" charset="0"/>
+                  <a:cs typeface="Times New Roman" panose="02020603050405020304" pitchFamily="18" charset="0"/>
+                </a:rPr>
+                <a:t> </a:t>
+              </a:r>
+              <a:r>
+                <a:rPr lang="en-AU" sz="2400" kern="100" dirty="0">
+                  <a:solidFill>
+                    <a:schemeClr val="accent1">
+                      <a:lumMod val="60000"/>
+                      <a:lumOff val="40000"/>
+                    </a:schemeClr>
+                  </a:solidFill>
+                  <a:effectLst/>
+                  <a:latin typeface="Calibri" panose="020F0502020204030204" pitchFamily="34" charset="0"/>
+                  <a:ea typeface="Calibri" panose="020F0502020204030204" pitchFamily="34" charset="0"/>
+                  <a:cs typeface="Times New Roman" panose="02020603050405020304" pitchFamily="18" charset="0"/>
+                </a:rPr>
+                <a:t> </a:t>
+              </a:r>
+            </a:p>
+            <a:p>
+              <a:endParaRPr lang="en-AU" sz="2400" dirty="0">
+                <a:solidFill>
+                  <a:schemeClr val="accent1">
+                    <a:lumMod val="60000"/>
+                    <a:lumOff val="40000"/>
+                  </a:schemeClr>
+                </a:solidFill>
+              </a:endParaRPr>
+            </a:p>
+          </p:txBody>
+        </p:sp>
+      </p:grpSp>
+      <p:grpSp>
+        <p:nvGrpSpPr>
+          <p:cNvPr id="6" name="Group 5">
+            <a:extLst>
+              <a:ext uri="{FF2B5EF4-FFF2-40B4-BE49-F238E27FC236}">
+                <a16:creationId xmlns:a16="http://schemas.microsoft.com/office/drawing/2014/main" id="{4CB4A785-DD59-6E3D-8A86-C6B36A64D744}"/>
+              </a:ext>
+            </a:extLst>
+          </p:cNvPr>
+          <p:cNvGrpSpPr/>
+          <p:nvPr/>
+        </p:nvGrpSpPr>
+        <p:grpSpPr>
+          <a:xfrm>
+            <a:off x="5579699" y="3367069"/>
+            <a:ext cx="6547322" cy="3042149"/>
+            <a:chOff x="5587042" y="3367369"/>
+            <a:chExt cx="6547322" cy="3042149"/>
+          </a:xfrm>
+        </p:grpSpPr>
+        <p:grpSp>
+          <p:nvGrpSpPr>
+            <p:cNvPr id="88" name="Group 87">
+              <a:extLst>
+                <a:ext uri="{FF2B5EF4-FFF2-40B4-BE49-F238E27FC236}">
+                  <a16:creationId xmlns:a16="http://schemas.microsoft.com/office/drawing/2014/main" id="{B317216B-3692-9959-E8B5-8A7A18E4748D}"/>
+                </a:ext>
+              </a:extLst>
+            </p:cNvPr>
+            <p:cNvGrpSpPr/>
+            <p:nvPr/>
+          </p:nvGrpSpPr>
+          <p:grpSpPr>
+            <a:xfrm>
+              <a:off x="5953384" y="3367369"/>
+              <a:ext cx="6180980" cy="3042149"/>
+              <a:chOff x="5623717" y="3221755"/>
+              <a:chExt cx="4917350" cy="3042149"/>
+            </a:xfrm>
+          </p:grpSpPr>
+          <p:sp>
+            <p:nvSpPr>
+              <p:cNvPr id="2" name="Rectangle 1">
+                <a:extLst>
+                  <a:ext uri="{FF2B5EF4-FFF2-40B4-BE49-F238E27FC236}">
+                    <a16:creationId xmlns:a16="http://schemas.microsoft.com/office/drawing/2014/main" id="{0A9D2A6D-12CF-41CA-9B39-4855A57C3F80}"/>
+                  </a:ext>
+                </a:extLst>
+              </p:cNvPr>
+              <p:cNvSpPr/>
+              <p:nvPr/>
+            </p:nvSpPr>
+            <p:spPr>
+              <a:xfrm>
+                <a:off x="5746685" y="3770185"/>
+                <a:ext cx="4794382" cy="2493719"/>
+              </a:xfrm>
+              <a:prstGeom prst="rect">
+                <a:avLst/>
+              </a:prstGeom>
+              <a:solidFill>
+                <a:schemeClr val="accent6">
+                  <a:lumMod val="60000"/>
+                  <a:lumOff val="40000"/>
+                </a:schemeClr>
+              </a:solidFill>
+              <a:scene3d>
+                <a:camera prst="isometricOffAxis1Right"/>
+                <a:lightRig rig="threePt" dir="t"/>
+              </a:scene3d>
+              <a:sp3d extrusionH="1803400">
+                <a:extrusionClr>
+                  <a:schemeClr val="accent6">
+                    <a:lumMod val="50000"/>
+                  </a:schemeClr>
+                </a:extrusionClr>
+              </a:sp3d>
+            </p:spPr>
+            <p:style>
+              <a:lnRef idx="2">
+                <a:schemeClr val="accent1">
+                  <a:shade val="50000"/>
+                </a:schemeClr>
+              </a:lnRef>
+              <a:fillRef idx="1">
+                <a:schemeClr val="accent1"/>
+              </a:fillRef>
+              <a:effectRef idx="0">
+                <a:schemeClr val="accent1"/>
+              </a:effectRef>
+              <a:fontRef idx="minor">
+                <a:schemeClr val="lt1"/>
+              </a:fontRef>
+            </p:style>
+            <p:txBody>
+              <a:bodyPr rtlCol="0" anchor="ctr"/>
+              <a:lstStyle/>
+              <a:p>
+                <a:pPr algn="ctr"/>
+                <a:endParaRPr lang="en-AU"/>
+              </a:p>
+            </p:txBody>
+          </p:sp>
+          <p:pic>
+            <p:nvPicPr>
+              <p:cNvPr id="5" name="Picture 4">
+                <a:extLst>
+                  <a:ext uri="{FF2B5EF4-FFF2-40B4-BE49-F238E27FC236}">
+                    <a16:creationId xmlns:a16="http://schemas.microsoft.com/office/drawing/2014/main" id="{4DDBD2DF-BBB9-B531-19FD-F3E5D54946B1}"/>
+                  </a:ext>
+                </a:extLst>
+              </p:cNvPr>
+              <p:cNvPicPr>
+                <a:picLocks noChangeAspect="1"/>
+              </p:cNvPicPr>
+              <p:nvPr/>
+            </p:nvPicPr>
+            <p:blipFill>
+              <a:blip r:embed="rId2"/>
+              <a:stretch>
+                <a:fillRect/>
+              </a:stretch>
+            </p:blipFill>
+            <p:spPr>
+              <a:xfrm>
+                <a:off x="6032521" y="4099483"/>
+                <a:ext cx="2662710" cy="1240096"/>
+              </a:xfrm>
+              <a:prstGeom prst="rect">
+                <a:avLst/>
+              </a:prstGeom>
+              <a:solidFill>
+                <a:schemeClr val="accent6">
+                  <a:lumMod val="60000"/>
+                  <a:lumOff val="40000"/>
+                </a:schemeClr>
+              </a:solidFill>
+              <a:scene3d>
+                <a:camera prst="isometricOffAxis1Right"/>
+                <a:lightRig rig="threePt" dir="t"/>
+              </a:scene3d>
+            </p:spPr>
+          </p:pic>
+          <p:sp>
+            <p:nvSpPr>
+              <p:cNvPr id="19" name="TextBox 18">
+                <a:extLst>
+                  <a:ext uri="{FF2B5EF4-FFF2-40B4-BE49-F238E27FC236}">
+                    <a16:creationId xmlns:a16="http://schemas.microsoft.com/office/drawing/2014/main" id="{15AAA5EA-4BF5-C3B1-43B1-353DDA63A2D7}"/>
+                  </a:ext>
+                </a:extLst>
+              </p:cNvPr>
+              <p:cNvSpPr txBox="1"/>
+              <p:nvPr/>
+            </p:nvSpPr>
+            <p:spPr>
+              <a:xfrm>
+                <a:off x="5623717" y="3221755"/>
+                <a:ext cx="4820842" cy="646331"/>
+              </a:xfrm>
+              <a:prstGeom prst="rect">
+                <a:avLst/>
+              </a:prstGeom>
+              <a:noFill/>
+              <a:scene3d>
+                <a:camera prst="isometricOffAxis1Right"/>
+                <a:lightRig rig="threePt" dir="t"/>
+              </a:scene3d>
+            </p:spPr>
+            <p:txBody>
+              <a:bodyPr wrap="none" rtlCol="0">
+                <a:spAutoFit/>
+              </a:bodyPr>
+              <a:lstStyle/>
+              <a:p>
+                <a:r>
+                  <a:rPr lang="en-AU" dirty="0">
+                    <a:solidFill>
+                      <a:schemeClr val="bg1"/>
+                    </a:solidFill>
+                  </a:rPr>
+                  <a:t>Relational Expressions with Fixed-Point Operators</a:t>
+                </a:r>
+              </a:p>
+              <a:p>
+                <a:pPr algn="ctr"/>
+                <a:r>
+                  <a:rPr lang="en-AU" dirty="0">
+                    <a:solidFill>
+                      <a:schemeClr val="bg1"/>
+                    </a:solidFill>
+                  </a:rPr>
+                  <a:t>Relational Algebra, SQL, Datalog, LINQ, PRQL, Morel, Malloy, …</a:t>
+                </a:r>
+              </a:p>
+            </p:txBody>
+          </p:sp>
+          <p:sp>
+            <p:nvSpPr>
+              <p:cNvPr id="33" name="TextBox 32">
+                <a:extLst>
+                  <a:ext uri="{FF2B5EF4-FFF2-40B4-BE49-F238E27FC236}">
+                    <a16:creationId xmlns:a16="http://schemas.microsoft.com/office/drawing/2014/main" id="{9B8BEA76-225A-F196-32D0-7D3F0329890D}"/>
+                  </a:ext>
+                </a:extLst>
+              </p:cNvPr>
+              <p:cNvSpPr txBox="1"/>
+              <p:nvPr/>
+            </p:nvSpPr>
+            <p:spPr>
+              <a:xfrm>
+                <a:off x="6490991" y="5324894"/>
+                <a:ext cx="3548105" cy="769441"/>
+              </a:xfrm>
+              <a:prstGeom prst="rect">
+                <a:avLst/>
+              </a:prstGeom>
+              <a:solidFill>
+                <a:srgbClr val="7F7F7F">
+                  <a:alpha val="38039"/>
+                </a:srgbClr>
+              </a:solidFill>
+              <a:scene3d>
+                <a:camera prst="isometricOffAxis1Right"/>
+                <a:lightRig rig="threePt" dir="t"/>
+              </a:scene3d>
+            </p:spPr>
+            <p:txBody>
+              <a:bodyPr wrap="square" rtlCol="0">
+                <a:spAutoFit/>
+              </a:bodyPr>
+              <a:lstStyle/>
+              <a:p>
+                <a:pPr algn="ctr"/>
+                <a:r>
+                  <a:rPr lang="en-AU" sz="2400" dirty="0"/>
+                  <a:t>Derived Relations</a:t>
+                </a:r>
+                <a:br>
+                  <a:rPr lang="en-AU" sz="2400" dirty="0"/>
+                </a:br>
+                <a:r>
+                  <a:rPr lang="en-AU" sz="2000" dirty="0"/>
+                  <a:t>(Data Transformation and Computation)</a:t>
+                </a:r>
+                <a:endParaRPr lang="en-AU" sz="2400" dirty="0"/>
+              </a:p>
+            </p:txBody>
+          </p:sp>
+          <p:pic>
+            <p:nvPicPr>
+              <p:cNvPr id="10" name="Picture 9">
+                <a:extLst>
+                  <a:ext uri="{FF2B5EF4-FFF2-40B4-BE49-F238E27FC236}">
+                    <a16:creationId xmlns:a16="http://schemas.microsoft.com/office/drawing/2014/main" id="{9BA138B9-41C2-31B0-8185-978017F64334}"/>
+                  </a:ext>
+                </a:extLst>
+              </p:cNvPr>
+              <p:cNvPicPr>
+                <a:picLocks noChangeAspect="1"/>
+              </p:cNvPicPr>
+              <p:nvPr/>
+            </p:nvPicPr>
+            <p:blipFill>
+              <a:blip r:embed="rId2"/>
+              <a:stretch>
+                <a:fillRect/>
+              </a:stretch>
+            </p:blipFill>
+            <p:spPr>
+              <a:xfrm>
+                <a:off x="6647889" y="3985258"/>
+                <a:ext cx="2662710" cy="1240096"/>
+              </a:xfrm>
+              <a:prstGeom prst="rect">
+                <a:avLst/>
+              </a:prstGeom>
+              <a:solidFill>
+                <a:schemeClr val="accent6">
+                  <a:lumMod val="60000"/>
+                  <a:lumOff val="40000"/>
+                </a:schemeClr>
+              </a:solidFill>
+              <a:scene3d>
+                <a:camera prst="isometricOffAxis1Right"/>
+                <a:lightRig rig="threePt" dir="t"/>
+              </a:scene3d>
+            </p:spPr>
+          </p:pic>
+          <p:pic>
+            <p:nvPicPr>
+              <p:cNvPr id="11" name="Picture 10">
+                <a:extLst>
+                  <a:ext uri="{FF2B5EF4-FFF2-40B4-BE49-F238E27FC236}">
+                    <a16:creationId xmlns:a16="http://schemas.microsoft.com/office/drawing/2014/main" id="{36AABABC-9FFB-3E43-E2DC-0F62CBCA1565}"/>
+                  </a:ext>
+                </a:extLst>
+              </p:cNvPr>
+              <p:cNvPicPr>
+                <a:picLocks noChangeAspect="1"/>
+              </p:cNvPicPr>
+              <p:nvPr/>
+            </p:nvPicPr>
+            <p:blipFill>
+              <a:blip r:embed="rId2"/>
+              <a:stretch>
+                <a:fillRect/>
+              </a:stretch>
+            </p:blipFill>
+            <p:spPr>
+              <a:xfrm>
+                <a:off x="7263257" y="3877245"/>
+                <a:ext cx="2662710" cy="1240096"/>
+              </a:xfrm>
+              <a:prstGeom prst="rect">
+                <a:avLst/>
+              </a:prstGeom>
+              <a:solidFill>
+                <a:schemeClr val="accent6">
+                  <a:lumMod val="60000"/>
+                  <a:lumOff val="40000"/>
+                </a:schemeClr>
+              </a:solidFill>
+              <a:scene3d>
+                <a:camera prst="isometricOffAxis1Right"/>
+                <a:lightRig rig="threePt" dir="t"/>
+              </a:scene3d>
+            </p:spPr>
+          </p:pic>
+        </p:grpSp>
+        <p:sp>
+          <p:nvSpPr>
+            <p:cNvPr id="4" name="TextBox 3">
+              <a:extLst>
+                <a:ext uri="{FF2B5EF4-FFF2-40B4-BE49-F238E27FC236}">
+                  <a16:creationId xmlns:a16="http://schemas.microsoft.com/office/drawing/2014/main" id="{3C126DE3-AC48-0304-E259-867C7A07B35E}"/>
+                </a:ext>
+              </a:extLst>
+            </p:cNvPr>
+            <p:cNvSpPr txBox="1"/>
+            <p:nvPr/>
+          </p:nvSpPr>
+          <p:spPr>
+            <a:xfrm>
+              <a:off x="5587042" y="4292917"/>
+              <a:ext cx="1017916" cy="2062103"/>
+            </a:xfrm>
+            <a:prstGeom prst="rect">
+              <a:avLst/>
+            </a:prstGeom>
+            <a:noFill/>
+            <a:scene3d>
+              <a:camera prst="isometricLeftDown"/>
+              <a:lightRig rig="threePt" dir="t"/>
+            </a:scene3d>
+          </p:spPr>
+          <p:txBody>
+            <a:bodyPr wrap="square" rtlCol="0">
+              <a:spAutoFit/>
+            </a:bodyPr>
+            <a:lstStyle/>
+            <a:p>
+              <a:r>
+                <a:rPr lang="el-GR" sz="3200" b="1" kern="0" dirty="0">
+                  <a:solidFill>
+                    <a:schemeClr val="accent1">
+                      <a:lumMod val="60000"/>
+                      <a:lumOff val="40000"/>
+                    </a:schemeClr>
+                  </a:solidFill>
+                  <a:effectLst/>
+                  <a:latin typeface="Cambria Math" panose="02040503050406030204" pitchFamily="18" charset="0"/>
+                  <a:ea typeface="Times New Roman" panose="02020603050405020304" pitchFamily="18" charset="0"/>
+                  <a:cs typeface="Cambria Math" panose="02040503050406030204" pitchFamily="18" charset="0"/>
+                </a:rPr>
+                <a:t>σ π </a:t>
+              </a:r>
+              <a:br>
+                <a:rPr lang="en-AU" sz="3200" b="1" kern="0" dirty="0">
+                  <a:solidFill>
+                    <a:schemeClr val="accent1">
+                      <a:lumMod val="60000"/>
+                      <a:lumOff val="40000"/>
+                    </a:schemeClr>
+                  </a:solidFill>
+                  <a:effectLst/>
+                  <a:latin typeface="Cambria Math" panose="02040503050406030204" pitchFamily="18" charset="0"/>
+                  <a:ea typeface="Times New Roman" panose="02020603050405020304" pitchFamily="18" charset="0"/>
+                  <a:cs typeface="Cambria Math" panose="02040503050406030204" pitchFamily="18" charset="0"/>
+                </a:rPr>
+              </a:br>
+              <a:r>
+                <a:rPr lang="el-GR" sz="3200" b="1" kern="0" dirty="0">
+                  <a:solidFill>
+                    <a:schemeClr val="accent1">
+                      <a:lumMod val="60000"/>
+                      <a:lumOff val="40000"/>
+                    </a:schemeClr>
+                  </a:solidFill>
+                  <a:effectLst/>
+                  <a:latin typeface="Cambria Math" panose="02040503050406030204" pitchFamily="18" charset="0"/>
+                  <a:ea typeface="Times New Roman" panose="02020603050405020304" pitchFamily="18" charset="0"/>
+                  <a:cs typeface="Cambria Math" panose="02040503050406030204" pitchFamily="18" charset="0"/>
+                </a:rPr>
+                <a:t>ρ υ </a:t>
+              </a:r>
+              <a:br>
+                <a:rPr lang="en-AU" sz="3200" b="1" kern="0" dirty="0">
+                  <a:solidFill>
+                    <a:schemeClr val="accent1">
+                      <a:lumMod val="60000"/>
+                      <a:lumOff val="40000"/>
+                    </a:schemeClr>
+                  </a:solidFill>
+                  <a:effectLst/>
+                  <a:latin typeface="Cambria Math" panose="02040503050406030204" pitchFamily="18" charset="0"/>
+                  <a:ea typeface="Times New Roman" panose="02020603050405020304" pitchFamily="18" charset="0"/>
+                  <a:cs typeface="Cambria Math" panose="02040503050406030204" pitchFamily="18" charset="0"/>
+                </a:rPr>
+              </a:br>
+              <a:r>
+                <a:rPr lang="el-GR" sz="3200" b="1" kern="0" dirty="0">
+                  <a:solidFill>
+                    <a:schemeClr val="accent1">
+                      <a:lumMod val="60000"/>
+                      <a:lumOff val="40000"/>
+                    </a:schemeClr>
+                  </a:solidFill>
+                  <a:effectLst/>
+                  <a:latin typeface="Cambria Math" panose="02040503050406030204" pitchFamily="18" charset="0"/>
+                  <a:ea typeface="Times New Roman" panose="02020603050405020304" pitchFamily="18" charset="0"/>
+                  <a:cs typeface="Cambria Math" panose="02040503050406030204" pitchFamily="18" charset="0"/>
+                </a:rPr>
+                <a:t>– X </a:t>
+              </a:r>
+              <a:br>
+                <a:rPr lang="en-AU" sz="3200" b="1" kern="0" dirty="0">
+                  <a:solidFill>
+                    <a:schemeClr val="accent1">
+                      <a:lumMod val="60000"/>
+                      <a:lumOff val="40000"/>
+                    </a:schemeClr>
+                  </a:solidFill>
+                  <a:effectLst/>
+                  <a:latin typeface="Cambria Math" panose="02040503050406030204" pitchFamily="18" charset="0"/>
+                  <a:ea typeface="Times New Roman" panose="02020603050405020304" pitchFamily="18" charset="0"/>
+                  <a:cs typeface="Cambria Math" panose="02040503050406030204" pitchFamily="18" charset="0"/>
+                </a:rPr>
+              </a:br>
+              <a:r>
+                <a:rPr lang="el-GR" sz="3200" b="1" kern="0" dirty="0">
+                  <a:solidFill>
+                    <a:schemeClr val="accent1">
+                      <a:lumMod val="60000"/>
+                      <a:lumOff val="40000"/>
+                    </a:schemeClr>
+                  </a:solidFill>
+                  <a:effectLst/>
+                  <a:latin typeface="Cambria Math" panose="02040503050406030204" pitchFamily="18" charset="0"/>
+                  <a:ea typeface="Times New Roman" panose="02020603050405020304" pitchFamily="18" charset="0"/>
+                  <a:cs typeface="Cambria Math" panose="02040503050406030204" pitchFamily="18" charset="0"/>
+                </a:rPr>
+                <a:t>⋈</a:t>
+              </a:r>
+              <a:endParaRPr lang="en-AU" sz="3200" dirty="0">
+                <a:solidFill>
+                  <a:schemeClr val="accent1">
+                    <a:lumMod val="60000"/>
+                    <a:lumOff val="40000"/>
+                  </a:schemeClr>
+                </a:solidFill>
+              </a:endParaRPr>
+            </a:p>
+          </p:txBody>
+        </p:sp>
+      </p:grpSp>
+      <p:sp>
+        <p:nvSpPr>
+          <p:cNvPr id="12" name="Arrow: Right 11">
+            <a:extLst>
+              <a:ext uri="{FF2B5EF4-FFF2-40B4-BE49-F238E27FC236}">
+                <a16:creationId xmlns:a16="http://schemas.microsoft.com/office/drawing/2014/main" id="{A9253BE7-5DAB-E43F-F777-1F8EADF4AA71}"/>
+              </a:ext>
+            </a:extLst>
+          </p:cNvPr>
+          <p:cNvSpPr/>
+          <p:nvPr/>
+        </p:nvSpPr>
+        <p:spPr>
+          <a:xfrm>
+            <a:off x="5437082" y="2985838"/>
+            <a:ext cx="1017917" cy="713282"/>
+          </a:xfrm>
+          <a:prstGeom prst="rightArrow">
+            <a:avLst/>
+          </a:prstGeom>
+          <a:solidFill>
+            <a:schemeClr val="tx1">
+              <a:lumMod val="50000"/>
+              <a:lumOff val="50000"/>
+            </a:schemeClr>
+          </a:solidFill>
+          <a:ln>
+            <a:solidFill>
+              <a:schemeClr val="tx1"/>
+            </a:solidFill>
+          </a:ln>
+          <a:scene3d>
+            <a:camera prst="isometricOffAxis2Top">
+              <a:rot lat="1155408" lon="3076870" rev="21460309"/>
+            </a:camera>
+            <a:lightRig rig="threePt" dir="t"/>
+          </a:scene3d>
+          <a:sp3d extrusionH="165100"/>
+        </p:spPr>
+        <p:style>
+          <a:lnRef idx="2">
+            <a:schemeClr val="accent1">
+              <a:shade val="50000"/>
+            </a:schemeClr>
+          </a:lnRef>
+          <a:fillRef idx="1">
+            <a:schemeClr val="accent1"/>
+          </a:fillRef>
+          <a:effectRef idx="0">
+            <a:schemeClr val="accent1"/>
+          </a:effectRef>
+          <a:fontRef idx="minor">
+            <a:schemeClr val="lt1"/>
+          </a:fontRef>
+        </p:style>
+        <p:txBody>
+          <a:bodyPr rtlCol="0" anchor="ctr"/>
+          <a:lstStyle/>
+          <a:p>
+            <a:pPr algn="ctr"/>
+            <a:r>
+              <a:rPr lang="en-AU" sz="1400" dirty="0"/>
+              <a:t>relations</a:t>
+            </a:r>
+          </a:p>
+        </p:txBody>
+      </p:sp>
+    </p:spTree>
+    <p:extLst>
+      <p:ext uri="{BB962C8B-B14F-4D97-AF65-F5344CB8AC3E}">
+        <p14:creationId xmlns:p14="http://schemas.microsoft.com/office/powerpoint/2010/main" val="1098116255"/>
+      </p:ext>
+    </p:extLst>
+  </p:cSld>
+  <p:clrMapOvr>
+    <a:masterClrMapping/>
+  </p:clrMapOvr>
+</p:sld>
+</file>
+
+<file path=ppt/slides/slide7.xml><?xml version="1.0" encoding="utf-8"?>
 <p:sld xmlns:a="http://schemas.openxmlformats.org/drawingml/2006/main" xmlns:r="http://schemas.openxmlformats.org/officeDocument/2006/relationships" xmlns:p="http://schemas.openxmlformats.org/presentationml/2006/main">
   <p:cSld>
     <p:spTree>
@@ -32590,7 +34159,7 @@
 </p:sld>
 </file>
 
-<file path=ppt/slides/slide7.xml><?xml version="1.0" encoding="utf-8"?>
+<file path=ppt/slides/slide8.xml><?xml version="1.0" encoding="utf-8"?>
 <p:sld xmlns:a="http://schemas.openxmlformats.org/drawingml/2006/main" xmlns:r="http://schemas.openxmlformats.org/officeDocument/2006/relationships" xmlns:p="http://schemas.openxmlformats.org/presentationml/2006/main">
   <p:cSld>
     <p:spTree>

</xml_diff>